<commit_message>
Modify Binary Tree Introduction
</commit_message>
<xml_diff>
--- a/binary_tree/picture.pptx
+++ b/binary_tree/picture.pptx
@@ -7,6 +7,9 @@
   <p:sldIdLst>
     <p:sldId id="257" r:id="rId2"/>
     <p:sldId id="256" r:id="rId3"/>
+    <p:sldId id="259" r:id="rId4"/>
+    <p:sldId id="260" r:id="rId5"/>
+    <p:sldId id="258" r:id="rId6"/>
   </p:sldIdLst>
   <p:sldSz cx="12192000" cy="6858000"/>
   <p:notesSz cx="6858000" cy="9144000"/>
@@ -105,6 +108,11 @@
       </a:defRPr>
     </a:lvl9pPr>
   </p:defaultTextStyle>
+  <p:extLst>
+    <p:ext uri="{EFAFB233-063F-42B5-8137-9DF3F51BA10A}">
+      <p15:sldGuideLst xmlns:p15="http://schemas.microsoft.com/office/powerpoint/2012/main"/>
+    </p:ext>
+  </p:extLst>
 </p:presentation>
 </file>
 
@@ -239,7 +247,7 @@
           <a:p>
             <a:fld id="{2DFC1440-A244-49AF-BCF4-87C35B69BC53}" type="datetimeFigureOut">
               <a:rPr lang="zh-TW" altLang="en-US" smtClean="0"/>
-              <a:t>2021/5/24</a:t>
+              <a:t>2021/5/25</a:t>
             </a:fld>
             <a:endParaRPr lang="zh-TW" altLang="en-US"/>
           </a:p>
@@ -409,7 +417,7 @@
           <a:p>
             <a:fld id="{2DFC1440-A244-49AF-BCF4-87C35B69BC53}" type="datetimeFigureOut">
               <a:rPr lang="zh-TW" altLang="en-US" smtClean="0"/>
-              <a:t>2021/5/24</a:t>
+              <a:t>2021/5/25</a:t>
             </a:fld>
             <a:endParaRPr lang="zh-TW" altLang="en-US"/>
           </a:p>
@@ -589,7 +597,7 @@
           <a:p>
             <a:fld id="{2DFC1440-A244-49AF-BCF4-87C35B69BC53}" type="datetimeFigureOut">
               <a:rPr lang="zh-TW" altLang="en-US" smtClean="0"/>
-              <a:t>2021/5/24</a:t>
+              <a:t>2021/5/25</a:t>
             </a:fld>
             <a:endParaRPr lang="zh-TW" altLang="en-US"/>
           </a:p>
@@ -759,7 +767,7 @@
           <a:p>
             <a:fld id="{2DFC1440-A244-49AF-BCF4-87C35B69BC53}" type="datetimeFigureOut">
               <a:rPr lang="zh-TW" altLang="en-US" smtClean="0"/>
-              <a:t>2021/5/24</a:t>
+              <a:t>2021/5/25</a:t>
             </a:fld>
             <a:endParaRPr lang="zh-TW" altLang="en-US"/>
           </a:p>
@@ -1005,7 +1013,7 @@
           <a:p>
             <a:fld id="{2DFC1440-A244-49AF-BCF4-87C35B69BC53}" type="datetimeFigureOut">
               <a:rPr lang="zh-TW" altLang="en-US" smtClean="0"/>
-              <a:t>2021/5/24</a:t>
+              <a:t>2021/5/25</a:t>
             </a:fld>
             <a:endParaRPr lang="zh-TW" altLang="en-US"/>
           </a:p>
@@ -1237,7 +1245,7 @@
           <a:p>
             <a:fld id="{2DFC1440-A244-49AF-BCF4-87C35B69BC53}" type="datetimeFigureOut">
               <a:rPr lang="zh-TW" altLang="en-US" smtClean="0"/>
-              <a:t>2021/5/24</a:t>
+              <a:t>2021/5/25</a:t>
             </a:fld>
             <a:endParaRPr lang="zh-TW" altLang="en-US"/>
           </a:p>
@@ -1604,7 +1612,7 @@
           <a:p>
             <a:fld id="{2DFC1440-A244-49AF-BCF4-87C35B69BC53}" type="datetimeFigureOut">
               <a:rPr lang="zh-TW" altLang="en-US" smtClean="0"/>
-              <a:t>2021/5/24</a:t>
+              <a:t>2021/5/25</a:t>
             </a:fld>
             <a:endParaRPr lang="zh-TW" altLang="en-US"/>
           </a:p>
@@ -1722,7 +1730,7 @@
           <a:p>
             <a:fld id="{2DFC1440-A244-49AF-BCF4-87C35B69BC53}" type="datetimeFigureOut">
               <a:rPr lang="zh-TW" altLang="en-US" smtClean="0"/>
-              <a:t>2021/5/24</a:t>
+              <a:t>2021/5/25</a:t>
             </a:fld>
             <a:endParaRPr lang="zh-TW" altLang="en-US"/>
           </a:p>
@@ -1817,7 +1825,7 @@
           <a:p>
             <a:fld id="{2DFC1440-A244-49AF-BCF4-87C35B69BC53}" type="datetimeFigureOut">
               <a:rPr lang="zh-TW" altLang="en-US" smtClean="0"/>
-              <a:t>2021/5/24</a:t>
+              <a:t>2021/5/25</a:t>
             </a:fld>
             <a:endParaRPr lang="zh-TW" altLang="en-US"/>
           </a:p>
@@ -2094,7 +2102,7 @@
           <a:p>
             <a:fld id="{2DFC1440-A244-49AF-BCF4-87C35B69BC53}" type="datetimeFigureOut">
               <a:rPr lang="zh-TW" altLang="en-US" smtClean="0"/>
-              <a:t>2021/5/24</a:t>
+              <a:t>2021/5/25</a:t>
             </a:fld>
             <a:endParaRPr lang="zh-TW" altLang="en-US"/>
           </a:p>
@@ -2347,7 +2355,7 @@
           <a:p>
             <a:fld id="{2DFC1440-A244-49AF-BCF4-87C35B69BC53}" type="datetimeFigureOut">
               <a:rPr lang="zh-TW" altLang="en-US" smtClean="0"/>
-              <a:t>2021/5/24</a:t>
+              <a:t>2021/5/25</a:t>
             </a:fld>
             <a:endParaRPr lang="zh-TW" altLang="en-US"/>
           </a:p>
@@ -2560,7 +2568,7 @@
           <a:p>
             <a:fld id="{2DFC1440-A244-49AF-BCF4-87C35B69BC53}" type="datetimeFigureOut">
               <a:rPr lang="zh-TW" altLang="en-US" smtClean="0"/>
-              <a:t>2021/5/24</a:t>
+              <a:t>2021/5/25</a:t>
             </a:fld>
             <a:endParaRPr lang="zh-TW" altLang="en-US"/>
           </a:p>
@@ -3127,7 +3135,7 @@
         <p:spPr>
           <a:xfrm>
             <a:off x="10117975" y="978969"/>
-            <a:ext cx="877163" cy="369332"/>
+            <a:ext cx="951030" cy="369332"/>
           </a:xfrm>
           <a:prstGeom prst="rect">
             <a:avLst/>
@@ -3141,11 +3149,11 @@
           <a:lstStyle/>
           <a:p>
             <a:r>
-              <a:rPr lang="zh-TW" altLang="en-US" b="1" dirty="0" smtClean="0">
+              <a:rPr lang="en-US" altLang="zh-TW" b="1" dirty="0" smtClean="0">
                 <a:latin typeface="微軟正黑體" panose="020B0604030504040204" pitchFamily="34" charset="-120"/>
                 <a:ea typeface="微軟正黑體" panose="020B0604030504040204" pitchFamily="34" charset="-120"/>
               </a:rPr>
-              <a:t>第一層</a:t>
+              <a:t>Level 0</a:t>
             </a:r>
             <a:endParaRPr lang="zh-TW" altLang="en-US" b="1" dirty="0">
               <a:latin typeface="微軟正黑體" panose="020B0604030504040204" pitchFamily="34" charset="-120"/>
@@ -3163,7 +3171,7 @@
         <p:spPr>
           <a:xfrm>
             <a:off x="10117975" y="2558302"/>
-            <a:ext cx="877163" cy="369332"/>
+            <a:ext cx="951030" cy="369332"/>
           </a:xfrm>
           <a:prstGeom prst="rect">
             <a:avLst/>
@@ -3177,11 +3185,11 @@
           <a:lstStyle/>
           <a:p>
             <a:r>
-              <a:rPr lang="zh-TW" altLang="en-US" b="1" dirty="0" smtClean="0">
+              <a:rPr lang="en-US" altLang="zh-TW" b="1" dirty="0" smtClean="0">
                 <a:latin typeface="微軟正黑體" panose="020B0604030504040204" pitchFamily="34" charset="-120"/>
                 <a:ea typeface="微軟正黑體" panose="020B0604030504040204" pitchFamily="34" charset="-120"/>
               </a:rPr>
-              <a:t>第一層</a:t>
+              <a:t>Level 1</a:t>
             </a:r>
             <a:endParaRPr lang="zh-TW" altLang="en-US" b="1" dirty="0">
               <a:latin typeface="微軟正黑體" panose="020B0604030504040204" pitchFamily="34" charset="-120"/>
@@ -3198,8 +3206,8 @@
         </p:nvSpPr>
         <p:spPr>
           <a:xfrm>
-            <a:off x="10117974" y="3916411"/>
-            <a:ext cx="877163" cy="369332"/>
+            <a:off x="10155978" y="3923319"/>
+            <a:ext cx="951030" cy="369332"/>
           </a:xfrm>
           <a:prstGeom prst="rect">
             <a:avLst/>
@@ -3213,11 +3221,11 @@
           <a:lstStyle/>
           <a:p>
             <a:r>
-              <a:rPr lang="zh-TW" altLang="en-US" b="1" dirty="0" smtClean="0">
+              <a:rPr lang="en-US" altLang="zh-TW" b="1" dirty="0" smtClean="0">
                 <a:latin typeface="微軟正黑體" panose="020B0604030504040204" pitchFamily="34" charset="-120"/>
                 <a:ea typeface="微軟正黑體" panose="020B0604030504040204" pitchFamily="34" charset="-120"/>
               </a:rPr>
-              <a:t>第三層</a:t>
+              <a:t>Level 2</a:t>
             </a:r>
             <a:endParaRPr lang="zh-TW" altLang="en-US" b="1" dirty="0">
               <a:latin typeface="微軟正黑體" panose="020B0604030504040204" pitchFamily="34" charset="-120"/>
@@ -4965,6 +4973,3196 @@
     <p:extLst>
       <p:ext uri="{BB962C8B-B14F-4D97-AF65-F5344CB8AC3E}">
         <p14:creationId xmlns:p14="http://schemas.microsoft.com/office/powerpoint/2010/main" val="363894057"/>
+      </p:ext>
+    </p:extLst>
+  </p:cSld>
+  <p:clrMapOvr>
+    <a:masterClrMapping/>
+  </p:clrMapOvr>
+</p:sld>
+</file>
+
+<file path=ppt/slides/slide3.xml><?xml version="1.0" encoding="utf-8"?>
+<p:sld xmlns:a="http://schemas.openxmlformats.org/drawingml/2006/main" xmlns:r="http://schemas.openxmlformats.org/officeDocument/2006/relationships" xmlns:p="http://schemas.openxmlformats.org/presentationml/2006/main">
+  <p:cSld>
+    <p:spTree>
+      <p:nvGrpSpPr>
+        <p:cNvPr id="1" name=""/>
+        <p:cNvGrpSpPr/>
+        <p:nvPr/>
+      </p:nvGrpSpPr>
+      <p:grpSpPr>
+        <a:xfrm>
+          <a:off x="0" y="0"/>
+          <a:ext cx="0" cy="0"/>
+          <a:chOff x="0" y="0"/>
+          <a:chExt cx="0" cy="0"/>
+        </a:xfrm>
+      </p:grpSpPr>
+      <mc:AlternateContent xmlns:mc="http://schemas.openxmlformats.org/markup-compatibility/2006">
+        <mc:Choice xmlns:a14="http://schemas.microsoft.com/office/drawing/2010/main" Requires="a14">
+          <p:sp>
+            <p:nvSpPr>
+              <p:cNvPr id="4" name="文字方塊 3"/>
+              <p:cNvSpPr txBox="1"/>
+              <p:nvPr/>
+            </p:nvSpPr>
+            <p:spPr>
+              <a:xfrm>
+                <a:off x="857634" y="939268"/>
+                <a:ext cx="2507720" cy="1297599"/>
+              </a:xfrm>
+              <a:prstGeom prst="rect">
+                <a:avLst/>
+              </a:prstGeom>
+              <a:noFill/>
+            </p:spPr>
+            <p:txBody>
+              <a:bodyPr wrap="square" rtlCol="0">
+                <a:spAutoFit/>
+              </a:bodyPr>
+              <a:lstStyle/>
+              <a:p>
+                <a14:m>
+                  <m:oMath xmlns:m="http://schemas.openxmlformats.org/officeDocument/2006/math">
+                    <m:sSup>
+                      <m:sSupPr>
+                        <m:ctrlPr>
+                          <a:rPr lang="en-US" altLang="zh-TW" i="1" smtClean="0">
+                            <a:latin typeface="Cambria Math" panose="02040503050406030204" pitchFamily="18" charset="0"/>
+                          </a:rPr>
+                        </m:ctrlPr>
+                      </m:sSupPr>
+                      <m:e>
+                        <m:r>
+                          <a:rPr lang="zh-TW" altLang="en-US" b="1" i="1">
+                            <a:latin typeface="Cambria Math" panose="02040503050406030204" pitchFamily="18" charset="0"/>
+                          </a:rPr>
+                          <m:t>公式</m:t>
+                        </m:r>
+                        <m:r>
+                          <a:rPr lang="en-US" altLang="zh-TW" b="1" i="1" smtClean="0">
+                            <a:latin typeface="Cambria Math" panose="02040503050406030204" pitchFamily="18" charset="0"/>
+                          </a:rPr>
+                          <m:t>:</m:t>
+                        </m:r>
+                        <m:r>
+                          <a:rPr lang="zh-TW" altLang="en-US" b="1" i="1">
+                            <a:latin typeface="Cambria Math" panose="02040503050406030204" pitchFamily="18" charset="0"/>
+                          </a:rPr>
+                          <m:t> </m:t>
+                        </m:r>
+                        <m:r>
+                          <a:rPr lang="en-US" altLang="zh-TW" b="0" i="1" smtClean="0">
+                            <a:latin typeface="Cambria Math" panose="02040503050406030204" pitchFamily="18" charset="0"/>
+                          </a:rPr>
+                          <m:t>2</m:t>
+                        </m:r>
+                      </m:e>
+                      <m:sup>
+                        <m:r>
+                          <a:rPr lang="en-US" altLang="zh-TW" b="0" i="1" smtClean="0">
+                            <a:latin typeface="Cambria Math" panose="02040503050406030204" pitchFamily="18" charset="0"/>
+                          </a:rPr>
+                          <m:t>h</m:t>
+                        </m:r>
+                      </m:sup>
+                    </m:sSup>
+                    <m:r>
+                      <a:rPr lang="en-US" altLang="zh-TW" b="0" i="1" smtClean="0">
+                        <a:latin typeface="Cambria Math" panose="02040503050406030204" pitchFamily="18" charset="0"/>
+                      </a:rPr>
+                      <m:t> −1</m:t>
+                    </m:r>
+                  </m:oMath>
+                </a14:m>
+                <a:r>
+                  <a:rPr lang="zh-TW" altLang="en-US" dirty="0" smtClean="0"/>
+                  <a:t> </a:t>
+                </a:r>
+                <a:r>
+                  <a:rPr lang="en-US" altLang="zh-TW" dirty="0" smtClean="0"/>
+                  <a:t>= N</a:t>
+                </a:r>
+              </a:p>
+              <a:p>
+                <a:endParaRPr lang="en-US" altLang="zh-TW" dirty="0" smtClean="0"/>
+              </a:p>
+              <a:p>
+                <a:r>
+                  <a:rPr lang="en-US" altLang="zh-TW" sz="1200" dirty="0">
+                    <a:latin typeface="微軟正黑體" panose="020B0604030504040204" pitchFamily="34" charset="-120"/>
+                    <a:ea typeface="微軟正黑體" panose="020B0604030504040204" pitchFamily="34" charset="-120"/>
+                  </a:rPr>
+                  <a:t>h</a:t>
+                </a:r>
+                <a:r>
+                  <a:rPr lang="en-US" altLang="zh-TW" sz="1200" dirty="0" smtClean="0">
+                    <a:latin typeface="微軟正黑體" panose="020B0604030504040204" pitchFamily="34" charset="-120"/>
+                    <a:ea typeface="微軟正黑體" panose="020B0604030504040204" pitchFamily="34" charset="-120"/>
+                  </a:rPr>
+                  <a:t>: </a:t>
+                </a:r>
+                <a:r>
+                  <a:rPr lang="zh-TW" altLang="en-US" sz="1200" dirty="0" smtClean="0">
+                    <a:latin typeface="微軟正黑體" panose="020B0604030504040204" pitchFamily="34" charset="-120"/>
+                    <a:ea typeface="微軟正黑體" panose="020B0604030504040204" pitchFamily="34" charset="-120"/>
+                  </a:rPr>
+                  <a:t>高度</a:t>
+                </a:r>
+                <a:endParaRPr lang="en-US" altLang="zh-TW" sz="1200" dirty="0" smtClean="0">
+                  <a:latin typeface="微軟正黑體" panose="020B0604030504040204" pitchFamily="34" charset="-120"/>
+                  <a:ea typeface="微軟正黑體" panose="020B0604030504040204" pitchFamily="34" charset="-120"/>
+                </a:endParaRPr>
+              </a:p>
+              <a:p>
+                <a:r>
+                  <a:rPr lang="en-US" altLang="zh-TW" sz="1200" dirty="0">
+                    <a:latin typeface="微軟正黑體" panose="020B0604030504040204" pitchFamily="34" charset="-120"/>
+                    <a:ea typeface="微軟正黑體" panose="020B0604030504040204" pitchFamily="34" charset="-120"/>
+                  </a:rPr>
+                  <a:t>N</a:t>
+                </a:r>
+                <a:r>
+                  <a:rPr lang="en-US" altLang="zh-TW" sz="1200" dirty="0" smtClean="0">
+                    <a:latin typeface="微軟正黑體" panose="020B0604030504040204" pitchFamily="34" charset="-120"/>
+                    <a:ea typeface="微軟正黑體" panose="020B0604030504040204" pitchFamily="34" charset="-120"/>
+                  </a:rPr>
+                  <a:t>: </a:t>
+                </a:r>
+                <a:r>
+                  <a:rPr lang="zh-TW" altLang="en-US" sz="1200" dirty="0" smtClean="0">
+                    <a:latin typeface="微軟正黑體" panose="020B0604030504040204" pitchFamily="34" charset="-120"/>
+                    <a:ea typeface="微軟正黑體" panose="020B0604030504040204" pitchFamily="34" charset="-120"/>
+                  </a:rPr>
+                  <a:t>節點數量</a:t>
+                </a:r>
+                <a:endParaRPr lang="en-US" altLang="zh-TW" sz="1200" dirty="0">
+                  <a:latin typeface="微軟正黑體" panose="020B0604030504040204" pitchFamily="34" charset="-120"/>
+                  <a:ea typeface="微軟正黑體" panose="020B0604030504040204" pitchFamily="34" charset="-120"/>
+                </a:endParaRPr>
+              </a:p>
+              <a:p>
+                <a:endParaRPr lang="zh-TW" altLang="en-US" dirty="0"/>
+              </a:p>
+            </p:txBody>
+          </p:sp>
+        </mc:Choice>
+        <mc:Fallback>
+          <p:sp>
+            <p:nvSpPr>
+              <p:cNvPr id="4" name="文字方塊 3"/>
+              <p:cNvSpPr txBox="1">
+                <a:spLocks noRot="1" noChangeAspect="1" noMove="1" noResize="1" noEditPoints="1" noAdjustHandles="1" noChangeArrowheads="1" noChangeShapeType="1" noTextEdit="1"/>
+              </p:cNvSpPr>
+              <p:nvPr/>
+            </p:nvSpPr>
+            <p:spPr>
+              <a:xfrm>
+                <a:off x="857634" y="939268"/>
+                <a:ext cx="2507720" cy="1297599"/>
+              </a:xfrm>
+              <a:prstGeom prst="rect">
+                <a:avLst/>
+              </a:prstGeom>
+              <a:blipFill>
+                <a:blip r:embed="rId2"/>
+                <a:stretch>
+                  <a:fillRect l="-973" t="-1878"/>
+                </a:stretch>
+              </a:blipFill>
+            </p:spPr>
+            <p:txBody>
+              <a:bodyPr/>
+              <a:lstStyle/>
+              <a:p>
+                <a:r>
+                  <a:rPr lang="zh-TW" altLang="en-US">
+                    <a:noFill/>
+                  </a:rPr>
+                  <a:t> </a:t>
+                </a:r>
+              </a:p>
+            </p:txBody>
+          </p:sp>
+        </mc:Fallback>
+      </mc:AlternateContent>
+      <p:sp>
+        <p:nvSpPr>
+          <p:cNvPr id="5" name="橢圓 4"/>
+          <p:cNvSpPr/>
+          <p:nvPr/>
+        </p:nvSpPr>
+        <p:spPr>
+          <a:xfrm>
+            <a:off x="5409546" y="437571"/>
+            <a:ext cx="1146629" cy="1088571"/>
+          </a:xfrm>
+          <a:prstGeom prst="ellipse">
+            <a:avLst/>
+          </a:prstGeom>
+        </p:spPr>
+        <p:style>
+          <a:lnRef idx="2">
+            <a:schemeClr val="accent1">
+              <a:shade val="50000"/>
+            </a:schemeClr>
+          </a:lnRef>
+          <a:fillRef idx="1">
+            <a:schemeClr val="accent1"/>
+          </a:fillRef>
+          <a:effectRef idx="0">
+            <a:schemeClr val="accent1"/>
+          </a:effectRef>
+          <a:fontRef idx="minor">
+            <a:schemeClr val="lt1"/>
+          </a:fontRef>
+        </p:style>
+        <p:txBody>
+          <a:bodyPr rtlCol="0" anchor="ctr"/>
+          <a:lstStyle/>
+          <a:p>
+            <a:pPr algn="ctr"/>
+            <a:r>
+              <a:rPr lang="en-US" altLang="zh-TW" sz="2800" dirty="0"/>
+              <a:t>1</a:t>
+            </a:r>
+            <a:endParaRPr lang="zh-TW" altLang="en-US" sz="2800" dirty="0"/>
+          </a:p>
+        </p:txBody>
+      </p:sp>
+      <p:sp>
+        <p:nvSpPr>
+          <p:cNvPr id="6" name="橢圓 5"/>
+          <p:cNvSpPr/>
+          <p:nvPr/>
+        </p:nvSpPr>
+        <p:spPr>
+          <a:xfrm>
+            <a:off x="3016114" y="1914339"/>
+            <a:ext cx="1146629" cy="1088571"/>
+          </a:xfrm>
+          <a:prstGeom prst="ellipse">
+            <a:avLst/>
+          </a:prstGeom>
+        </p:spPr>
+        <p:style>
+          <a:lnRef idx="2">
+            <a:schemeClr val="accent1">
+              <a:shade val="50000"/>
+            </a:schemeClr>
+          </a:lnRef>
+          <a:fillRef idx="1">
+            <a:schemeClr val="accent1"/>
+          </a:fillRef>
+          <a:effectRef idx="0">
+            <a:schemeClr val="accent1"/>
+          </a:effectRef>
+          <a:fontRef idx="minor">
+            <a:schemeClr val="lt1"/>
+          </a:fontRef>
+        </p:style>
+        <p:txBody>
+          <a:bodyPr rtlCol="0" anchor="ctr"/>
+          <a:lstStyle/>
+          <a:p>
+            <a:pPr algn="ctr"/>
+            <a:r>
+              <a:rPr lang="en-US" altLang="zh-TW" sz="2800" dirty="0" smtClean="0"/>
+              <a:t>2</a:t>
+            </a:r>
+            <a:endParaRPr lang="zh-TW" altLang="en-US" sz="2800" dirty="0"/>
+          </a:p>
+        </p:txBody>
+      </p:sp>
+      <p:sp>
+        <p:nvSpPr>
+          <p:cNvPr id="7" name="橢圓 6"/>
+          <p:cNvSpPr/>
+          <p:nvPr/>
+        </p:nvSpPr>
+        <p:spPr>
+          <a:xfrm>
+            <a:off x="8016644" y="1848786"/>
+            <a:ext cx="1146629" cy="1088571"/>
+          </a:xfrm>
+          <a:prstGeom prst="ellipse">
+            <a:avLst/>
+          </a:prstGeom>
+        </p:spPr>
+        <p:style>
+          <a:lnRef idx="2">
+            <a:schemeClr val="accent1">
+              <a:shade val="50000"/>
+            </a:schemeClr>
+          </a:lnRef>
+          <a:fillRef idx="1">
+            <a:schemeClr val="accent1"/>
+          </a:fillRef>
+          <a:effectRef idx="0">
+            <a:schemeClr val="accent1"/>
+          </a:effectRef>
+          <a:fontRef idx="minor">
+            <a:schemeClr val="lt1"/>
+          </a:fontRef>
+        </p:style>
+        <p:txBody>
+          <a:bodyPr rtlCol="0" anchor="ctr"/>
+          <a:lstStyle/>
+          <a:p>
+            <a:pPr algn="ctr"/>
+            <a:r>
+              <a:rPr lang="en-US" altLang="zh-TW" sz="2800" dirty="0" smtClean="0"/>
+              <a:t>3</a:t>
+            </a:r>
+            <a:endParaRPr lang="zh-TW" altLang="en-US" sz="2800" dirty="0"/>
+          </a:p>
+        </p:txBody>
+      </p:sp>
+      <p:sp>
+        <p:nvSpPr>
+          <p:cNvPr id="8" name="橢圓 7"/>
+          <p:cNvSpPr/>
+          <p:nvPr/>
+        </p:nvSpPr>
+        <p:spPr>
+          <a:xfrm>
+            <a:off x="9710313" y="3465582"/>
+            <a:ext cx="1146629" cy="1088571"/>
+          </a:xfrm>
+          <a:prstGeom prst="ellipse">
+            <a:avLst/>
+          </a:prstGeom>
+        </p:spPr>
+        <p:style>
+          <a:lnRef idx="2">
+            <a:schemeClr val="accent1">
+              <a:shade val="50000"/>
+            </a:schemeClr>
+          </a:lnRef>
+          <a:fillRef idx="1">
+            <a:schemeClr val="accent1"/>
+          </a:fillRef>
+          <a:effectRef idx="0">
+            <a:schemeClr val="accent1"/>
+          </a:effectRef>
+          <a:fontRef idx="minor">
+            <a:schemeClr val="lt1"/>
+          </a:fontRef>
+        </p:style>
+        <p:txBody>
+          <a:bodyPr rtlCol="0" anchor="ctr"/>
+          <a:lstStyle/>
+          <a:p>
+            <a:pPr algn="ctr"/>
+            <a:r>
+              <a:rPr lang="en-US" altLang="zh-TW" sz="2800" dirty="0" smtClean="0"/>
+              <a:t>7</a:t>
+            </a:r>
+            <a:endParaRPr lang="zh-TW" altLang="en-US" sz="2800" dirty="0"/>
+          </a:p>
+        </p:txBody>
+      </p:sp>
+      <p:sp>
+        <p:nvSpPr>
+          <p:cNvPr id="9" name="橢圓 8"/>
+          <p:cNvSpPr/>
+          <p:nvPr/>
+        </p:nvSpPr>
+        <p:spPr>
+          <a:xfrm>
+            <a:off x="9350933" y="5200037"/>
+            <a:ext cx="1146629" cy="1088571"/>
+          </a:xfrm>
+          <a:prstGeom prst="ellipse">
+            <a:avLst/>
+          </a:prstGeom>
+        </p:spPr>
+        <p:style>
+          <a:lnRef idx="2">
+            <a:schemeClr val="accent1">
+              <a:shade val="50000"/>
+            </a:schemeClr>
+          </a:lnRef>
+          <a:fillRef idx="1">
+            <a:schemeClr val="accent1"/>
+          </a:fillRef>
+          <a:effectRef idx="0">
+            <a:schemeClr val="accent1"/>
+          </a:effectRef>
+          <a:fontRef idx="minor">
+            <a:schemeClr val="lt1"/>
+          </a:fontRef>
+        </p:style>
+        <p:txBody>
+          <a:bodyPr rtlCol="0" anchor="ctr"/>
+          <a:lstStyle/>
+          <a:p>
+            <a:pPr algn="ctr"/>
+            <a:r>
+              <a:rPr lang="en-US" altLang="zh-TW" sz="2800" dirty="0" smtClean="0"/>
+              <a:t>14</a:t>
+            </a:r>
+            <a:endParaRPr lang="zh-TW" altLang="en-US" sz="2800" dirty="0"/>
+          </a:p>
+        </p:txBody>
+      </p:sp>
+      <p:sp>
+        <p:nvSpPr>
+          <p:cNvPr id="10" name="橢圓 9"/>
+          <p:cNvSpPr/>
+          <p:nvPr/>
+        </p:nvSpPr>
+        <p:spPr>
+          <a:xfrm>
+            <a:off x="1538180" y="3523458"/>
+            <a:ext cx="1146629" cy="1088571"/>
+          </a:xfrm>
+          <a:prstGeom prst="ellipse">
+            <a:avLst/>
+          </a:prstGeom>
+        </p:spPr>
+        <p:style>
+          <a:lnRef idx="2">
+            <a:schemeClr val="accent1">
+              <a:shade val="50000"/>
+            </a:schemeClr>
+          </a:lnRef>
+          <a:fillRef idx="1">
+            <a:schemeClr val="accent1"/>
+          </a:fillRef>
+          <a:effectRef idx="0">
+            <a:schemeClr val="accent1"/>
+          </a:effectRef>
+          <a:fontRef idx="minor">
+            <a:schemeClr val="lt1"/>
+          </a:fontRef>
+        </p:style>
+        <p:txBody>
+          <a:bodyPr rtlCol="0" anchor="ctr"/>
+          <a:lstStyle/>
+          <a:p>
+            <a:pPr algn="ctr"/>
+            <a:r>
+              <a:rPr lang="en-US" altLang="zh-TW" sz="2800" dirty="0" smtClean="0"/>
+              <a:t>4</a:t>
+            </a:r>
+            <a:endParaRPr lang="zh-TW" altLang="en-US" sz="2800" dirty="0"/>
+          </a:p>
+        </p:txBody>
+      </p:sp>
+      <p:sp>
+        <p:nvSpPr>
+          <p:cNvPr id="11" name="橢圓 10"/>
+          <p:cNvSpPr/>
+          <p:nvPr/>
+        </p:nvSpPr>
+        <p:spPr>
+          <a:xfrm>
+            <a:off x="4472660" y="3465583"/>
+            <a:ext cx="1146629" cy="1088571"/>
+          </a:xfrm>
+          <a:prstGeom prst="ellipse">
+            <a:avLst/>
+          </a:prstGeom>
+        </p:spPr>
+        <p:style>
+          <a:lnRef idx="2">
+            <a:schemeClr val="accent1">
+              <a:shade val="50000"/>
+            </a:schemeClr>
+          </a:lnRef>
+          <a:fillRef idx="1">
+            <a:schemeClr val="accent1"/>
+          </a:fillRef>
+          <a:effectRef idx="0">
+            <a:schemeClr val="accent1"/>
+          </a:effectRef>
+          <a:fontRef idx="minor">
+            <a:schemeClr val="lt1"/>
+          </a:fontRef>
+        </p:style>
+        <p:txBody>
+          <a:bodyPr rtlCol="0" anchor="ctr"/>
+          <a:lstStyle/>
+          <a:p>
+            <a:pPr algn="ctr"/>
+            <a:r>
+              <a:rPr lang="en-US" altLang="zh-TW" sz="2800" dirty="0" smtClean="0"/>
+              <a:t>5</a:t>
+            </a:r>
+            <a:endParaRPr lang="zh-TW" altLang="en-US" sz="2800" dirty="0"/>
+          </a:p>
+        </p:txBody>
+      </p:sp>
+      <p:sp>
+        <p:nvSpPr>
+          <p:cNvPr id="12" name="橢圓 11"/>
+          <p:cNvSpPr/>
+          <p:nvPr/>
+        </p:nvSpPr>
+        <p:spPr>
+          <a:xfrm>
+            <a:off x="3627803" y="5200039"/>
+            <a:ext cx="1146629" cy="1088571"/>
+          </a:xfrm>
+          <a:prstGeom prst="ellipse">
+            <a:avLst/>
+          </a:prstGeom>
+        </p:spPr>
+        <p:style>
+          <a:lnRef idx="2">
+            <a:schemeClr val="accent1">
+              <a:shade val="50000"/>
+            </a:schemeClr>
+          </a:lnRef>
+          <a:fillRef idx="1">
+            <a:schemeClr val="accent1"/>
+          </a:fillRef>
+          <a:effectRef idx="0">
+            <a:schemeClr val="accent1"/>
+          </a:effectRef>
+          <a:fontRef idx="minor">
+            <a:schemeClr val="lt1"/>
+          </a:fontRef>
+        </p:style>
+        <p:txBody>
+          <a:bodyPr rtlCol="0" anchor="ctr"/>
+          <a:lstStyle/>
+          <a:p>
+            <a:pPr algn="ctr"/>
+            <a:r>
+              <a:rPr lang="en-US" altLang="zh-TW" sz="2800" dirty="0" smtClean="0"/>
+              <a:t>10</a:t>
+            </a:r>
+            <a:endParaRPr lang="zh-TW" altLang="en-US" sz="2800" dirty="0"/>
+          </a:p>
+        </p:txBody>
+      </p:sp>
+      <p:sp>
+        <p:nvSpPr>
+          <p:cNvPr id="13" name="橢圓 12"/>
+          <p:cNvSpPr/>
+          <p:nvPr/>
+        </p:nvSpPr>
+        <p:spPr>
+          <a:xfrm>
+            <a:off x="5318139" y="5200038"/>
+            <a:ext cx="1146629" cy="1088571"/>
+          </a:xfrm>
+          <a:prstGeom prst="ellipse">
+            <a:avLst/>
+          </a:prstGeom>
+        </p:spPr>
+        <p:style>
+          <a:lnRef idx="2">
+            <a:schemeClr val="accent1">
+              <a:shade val="50000"/>
+            </a:schemeClr>
+          </a:lnRef>
+          <a:fillRef idx="1">
+            <a:schemeClr val="accent1"/>
+          </a:fillRef>
+          <a:effectRef idx="0">
+            <a:schemeClr val="accent1"/>
+          </a:effectRef>
+          <a:fontRef idx="minor">
+            <a:schemeClr val="lt1"/>
+          </a:fontRef>
+        </p:style>
+        <p:txBody>
+          <a:bodyPr rtlCol="0" anchor="ctr"/>
+          <a:lstStyle/>
+          <a:p>
+            <a:pPr algn="ctr"/>
+            <a:r>
+              <a:rPr lang="en-US" altLang="zh-TW" sz="2800" dirty="0" smtClean="0"/>
+              <a:t>11</a:t>
+            </a:r>
+            <a:endParaRPr lang="zh-TW" altLang="en-US" sz="2800" dirty="0"/>
+          </a:p>
+        </p:txBody>
+      </p:sp>
+      <p:cxnSp>
+        <p:nvCxnSpPr>
+          <p:cNvPr id="14" name="直線單箭頭接點 13"/>
+          <p:cNvCxnSpPr/>
+          <p:nvPr/>
+        </p:nvCxnSpPr>
+        <p:spPr>
+          <a:xfrm flipH="1">
+            <a:off x="4201118" y="1296889"/>
+            <a:ext cx="1208428" cy="806374"/>
+          </a:xfrm>
+          <a:prstGeom prst="straightConnector1">
+            <a:avLst/>
+          </a:prstGeom>
+          <a:ln>
+            <a:tailEnd type="triangle"/>
+          </a:ln>
+        </p:spPr>
+        <p:style>
+          <a:lnRef idx="1">
+            <a:schemeClr val="dk1"/>
+          </a:lnRef>
+          <a:fillRef idx="0">
+            <a:schemeClr val="dk1"/>
+          </a:fillRef>
+          <a:effectRef idx="0">
+            <a:schemeClr val="dk1"/>
+          </a:effectRef>
+          <a:fontRef idx="minor">
+            <a:schemeClr val="tx1"/>
+          </a:fontRef>
+        </p:style>
+      </p:cxnSp>
+      <p:cxnSp>
+        <p:nvCxnSpPr>
+          <p:cNvPr id="15" name="直線單箭頭接點 14"/>
+          <p:cNvCxnSpPr/>
+          <p:nvPr/>
+        </p:nvCxnSpPr>
+        <p:spPr>
+          <a:xfrm>
+            <a:off x="6650400" y="1283562"/>
+            <a:ext cx="1366244" cy="630777"/>
+          </a:xfrm>
+          <a:prstGeom prst="straightConnector1">
+            <a:avLst/>
+          </a:prstGeom>
+          <a:ln>
+            <a:tailEnd type="triangle"/>
+          </a:ln>
+        </p:spPr>
+        <p:style>
+          <a:lnRef idx="1">
+            <a:schemeClr val="dk1"/>
+          </a:lnRef>
+          <a:fillRef idx="0">
+            <a:schemeClr val="dk1"/>
+          </a:fillRef>
+          <a:effectRef idx="0">
+            <a:schemeClr val="dk1"/>
+          </a:effectRef>
+          <a:fontRef idx="minor">
+            <a:schemeClr val="tx1"/>
+          </a:fontRef>
+        </p:style>
+      </p:cxnSp>
+      <p:cxnSp>
+        <p:nvCxnSpPr>
+          <p:cNvPr id="16" name="直線單箭頭接點 15"/>
+          <p:cNvCxnSpPr/>
+          <p:nvPr/>
+        </p:nvCxnSpPr>
+        <p:spPr>
+          <a:xfrm flipH="1">
+            <a:off x="2456934" y="2937357"/>
+            <a:ext cx="559180" cy="528225"/>
+          </a:xfrm>
+          <a:prstGeom prst="straightConnector1">
+            <a:avLst/>
+          </a:prstGeom>
+          <a:ln>
+            <a:tailEnd type="triangle"/>
+          </a:ln>
+        </p:spPr>
+        <p:style>
+          <a:lnRef idx="1">
+            <a:schemeClr val="dk1"/>
+          </a:lnRef>
+          <a:fillRef idx="0">
+            <a:schemeClr val="dk1"/>
+          </a:fillRef>
+          <a:effectRef idx="0">
+            <a:schemeClr val="dk1"/>
+          </a:effectRef>
+          <a:fontRef idx="minor">
+            <a:schemeClr val="tx1"/>
+          </a:fontRef>
+        </p:style>
+      </p:cxnSp>
+      <p:cxnSp>
+        <p:nvCxnSpPr>
+          <p:cNvPr id="17" name="直線單箭頭接點 16"/>
+          <p:cNvCxnSpPr/>
+          <p:nvPr/>
+        </p:nvCxnSpPr>
+        <p:spPr>
+          <a:xfrm>
+            <a:off x="4002374" y="2937357"/>
+            <a:ext cx="614596" cy="528225"/>
+          </a:xfrm>
+          <a:prstGeom prst="straightConnector1">
+            <a:avLst/>
+          </a:prstGeom>
+          <a:ln>
+            <a:tailEnd type="triangle"/>
+          </a:ln>
+        </p:spPr>
+        <p:style>
+          <a:lnRef idx="1">
+            <a:schemeClr val="dk1"/>
+          </a:lnRef>
+          <a:fillRef idx="0">
+            <a:schemeClr val="dk1"/>
+          </a:fillRef>
+          <a:effectRef idx="0">
+            <a:schemeClr val="dk1"/>
+          </a:effectRef>
+          <a:fontRef idx="minor">
+            <a:schemeClr val="tx1"/>
+          </a:fontRef>
+        </p:style>
+      </p:cxnSp>
+      <p:cxnSp>
+        <p:nvCxnSpPr>
+          <p:cNvPr id="18" name="直線單箭頭接點 17"/>
+          <p:cNvCxnSpPr/>
+          <p:nvPr/>
+        </p:nvCxnSpPr>
+        <p:spPr>
+          <a:xfrm flipH="1">
+            <a:off x="4201118" y="4554153"/>
+            <a:ext cx="459737" cy="542503"/>
+          </a:xfrm>
+          <a:prstGeom prst="straightConnector1">
+            <a:avLst/>
+          </a:prstGeom>
+          <a:ln>
+            <a:tailEnd type="triangle"/>
+          </a:ln>
+        </p:spPr>
+        <p:style>
+          <a:lnRef idx="1">
+            <a:schemeClr val="dk1"/>
+          </a:lnRef>
+          <a:fillRef idx="0">
+            <a:schemeClr val="dk1"/>
+          </a:fillRef>
+          <a:effectRef idx="0">
+            <a:schemeClr val="dk1"/>
+          </a:effectRef>
+          <a:fontRef idx="minor">
+            <a:schemeClr val="tx1"/>
+          </a:fontRef>
+        </p:style>
+      </p:cxnSp>
+      <p:cxnSp>
+        <p:nvCxnSpPr>
+          <p:cNvPr id="19" name="直線單箭頭接點 18"/>
+          <p:cNvCxnSpPr/>
+          <p:nvPr/>
+        </p:nvCxnSpPr>
+        <p:spPr>
+          <a:xfrm>
+            <a:off x="5287461" y="4603474"/>
+            <a:ext cx="465023" cy="503662"/>
+          </a:xfrm>
+          <a:prstGeom prst="straightConnector1">
+            <a:avLst/>
+          </a:prstGeom>
+          <a:ln>
+            <a:tailEnd type="triangle"/>
+          </a:ln>
+        </p:spPr>
+        <p:style>
+          <a:lnRef idx="1">
+            <a:schemeClr val="dk1"/>
+          </a:lnRef>
+          <a:fillRef idx="0">
+            <a:schemeClr val="dk1"/>
+          </a:fillRef>
+          <a:effectRef idx="0">
+            <a:schemeClr val="dk1"/>
+          </a:effectRef>
+          <a:fontRef idx="minor">
+            <a:schemeClr val="tx1"/>
+          </a:fontRef>
+        </p:style>
+      </p:cxnSp>
+      <p:cxnSp>
+        <p:nvCxnSpPr>
+          <p:cNvPr id="20" name="直線單箭頭接點 19"/>
+          <p:cNvCxnSpPr/>
+          <p:nvPr/>
+        </p:nvCxnSpPr>
+        <p:spPr>
+          <a:xfrm>
+            <a:off x="9189912" y="2830834"/>
+            <a:ext cx="580393" cy="591575"/>
+          </a:xfrm>
+          <a:prstGeom prst="straightConnector1">
+            <a:avLst/>
+          </a:prstGeom>
+          <a:ln>
+            <a:tailEnd type="triangle"/>
+          </a:ln>
+        </p:spPr>
+        <p:style>
+          <a:lnRef idx="1">
+            <a:schemeClr val="dk1"/>
+          </a:lnRef>
+          <a:fillRef idx="0">
+            <a:schemeClr val="dk1"/>
+          </a:fillRef>
+          <a:effectRef idx="0">
+            <a:schemeClr val="dk1"/>
+          </a:effectRef>
+          <a:fontRef idx="minor">
+            <a:schemeClr val="tx1"/>
+          </a:fontRef>
+        </p:style>
+      </p:cxnSp>
+      <p:cxnSp>
+        <p:nvCxnSpPr>
+          <p:cNvPr id="21" name="直線單箭頭接點 20"/>
+          <p:cNvCxnSpPr/>
+          <p:nvPr/>
+        </p:nvCxnSpPr>
+        <p:spPr>
+          <a:xfrm flipH="1">
+            <a:off x="10012779" y="4603474"/>
+            <a:ext cx="179451" cy="412946"/>
+          </a:xfrm>
+          <a:prstGeom prst="straightConnector1">
+            <a:avLst/>
+          </a:prstGeom>
+          <a:ln>
+            <a:tailEnd type="triangle"/>
+          </a:ln>
+        </p:spPr>
+        <p:style>
+          <a:lnRef idx="1">
+            <a:schemeClr val="dk1"/>
+          </a:lnRef>
+          <a:fillRef idx="0">
+            <a:schemeClr val="dk1"/>
+          </a:fillRef>
+          <a:effectRef idx="0">
+            <a:schemeClr val="dk1"/>
+          </a:effectRef>
+          <a:fontRef idx="minor">
+            <a:schemeClr val="tx1"/>
+          </a:fontRef>
+        </p:style>
+      </p:cxnSp>
+      <p:cxnSp>
+        <p:nvCxnSpPr>
+          <p:cNvPr id="22" name="直線單箭頭接點 21"/>
+          <p:cNvCxnSpPr/>
+          <p:nvPr/>
+        </p:nvCxnSpPr>
+        <p:spPr>
+          <a:xfrm flipH="1">
+            <a:off x="1243468" y="4554153"/>
+            <a:ext cx="459737" cy="542503"/>
+          </a:xfrm>
+          <a:prstGeom prst="straightConnector1">
+            <a:avLst/>
+          </a:prstGeom>
+          <a:ln>
+            <a:tailEnd type="triangle"/>
+          </a:ln>
+        </p:spPr>
+        <p:style>
+          <a:lnRef idx="1">
+            <a:schemeClr val="dk1"/>
+          </a:lnRef>
+          <a:fillRef idx="0">
+            <a:schemeClr val="dk1"/>
+          </a:fillRef>
+          <a:effectRef idx="0">
+            <a:schemeClr val="dk1"/>
+          </a:effectRef>
+          <a:fontRef idx="minor">
+            <a:schemeClr val="tx1"/>
+          </a:fontRef>
+        </p:style>
+      </p:cxnSp>
+      <p:cxnSp>
+        <p:nvCxnSpPr>
+          <p:cNvPr id="23" name="直線單箭頭接點 22"/>
+          <p:cNvCxnSpPr/>
+          <p:nvPr/>
+        </p:nvCxnSpPr>
+        <p:spPr>
+          <a:xfrm>
+            <a:off x="2415039" y="4638500"/>
+            <a:ext cx="465023" cy="503662"/>
+          </a:xfrm>
+          <a:prstGeom prst="straightConnector1">
+            <a:avLst/>
+          </a:prstGeom>
+          <a:ln>
+            <a:tailEnd type="triangle"/>
+          </a:ln>
+        </p:spPr>
+        <p:style>
+          <a:lnRef idx="1">
+            <a:schemeClr val="dk1"/>
+          </a:lnRef>
+          <a:fillRef idx="0">
+            <a:schemeClr val="dk1"/>
+          </a:fillRef>
+          <a:effectRef idx="0">
+            <a:schemeClr val="dk1"/>
+          </a:effectRef>
+          <a:fontRef idx="minor">
+            <a:schemeClr val="tx1"/>
+          </a:fontRef>
+        </p:style>
+      </p:cxnSp>
+      <p:sp>
+        <p:nvSpPr>
+          <p:cNvPr id="24" name="橢圓 23"/>
+          <p:cNvSpPr/>
+          <p:nvPr/>
+        </p:nvSpPr>
+        <p:spPr>
+          <a:xfrm>
+            <a:off x="10893478" y="5159208"/>
+            <a:ext cx="1146629" cy="1088571"/>
+          </a:xfrm>
+          <a:prstGeom prst="ellipse">
+            <a:avLst/>
+          </a:prstGeom>
+        </p:spPr>
+        <p:style>
+          <a:lnRef idx="2">
+            <a:schemeClr val="accent1">
+              <a:shade val="50000"/>
+            </a:schemeClr>
+          </a:lnRef>
+          <a:fillRef idx="1">
+            <a:schemeClr val="accent1"/>
+          </a:fillRef>
+          <a:effectRef idx="0">
+            <a:schemeClr val="accent1"/>
+          </a:effectRef>
+          <a:fontRef idx="minor">
+            <a:schemeClr val="lt1"/>
+          </a:fontRef>
+        </p:style>
+        <p:txBody>
+          <a:bodyPr rtlCol="0" anchor="ctr"/>
+          <a:lstStyle/>
+          <a:p>
+            <a:pPr algn="ctr"/>
+            <a:r>
+              <a:rPr lang="en-US" altLang="zh-TW" sz="2800" dirty="0" smtClean="0"/>
+              <a:t>15</a:t>
+            </a:r>
+            <a:endParaRPr lang="zh-TW" altLang="en-US" sz="2800" dirty="0"/>
+          </a:p>
+        </p:txBody>
+      </p:sp>
+      <p:cxnSp>
+        <p:nvCxnSpPr>
+          <p:cNvPr id="25" name="直線單箭頭接點 24"/>
+          <p:cNvCxnSpPr/>
+          <p:nvPr/>
+        </p:nvCxnSpPr>
+        <p:spPr>
+          <a:xfrm>
+            <a:off x="10836497" y="4475141"/>
+            <a:ext cx="465023" cy="503662"/>
+          </a:xfrm>
+          <a:prstGeom prst="straightConnector1">
+            <a:avLst/>
+          </a:prstGeom>
+          <a:ln>
+            <a:tailEnd type="triangle"/>
+          </a:ln>
+        </p:spPr>
+        <p:style>
+          <a:lnRef idx="1">
+            <a:schemeClr val="dk1"/>
+          </a:lnRef>
+          <a:fillRef idx="0">
+            <a:schemeClr val="dk1"/>
+          </a:fillRef>
+          <a:effectRef idx="0">
+            <a:schemeClr val="dk1"/>
+          </a:effectRef>
+          <a:fontRef idx="minor">
+            <a:schemeClr val="tx1"/>
+          </a:fontRef>
+        </p:style>
+      </p:cxnSp>
+      <p:cxnSp>
+        <p:nvCxnSpPr>
+          <p:cNvPr id="26" name="直線單箭頭接點 25"/>
+          <p:cNvCxnSpPr/>
+          <p:nvPr/>
+        </p:nvCxnSpPr>
+        <p:spPr>
+          <a:xfrm flipH="1">
+            <a:off x="7951407" y="2937357"/>
+            <a:ext cx="421926" cy="594662"/>
+          </a:xfrm>
+          <a:prstGeom prst="straightConnector1">
+            <a:avLst/>
+          </a:prstGeom>
+          <a:ln>
+            <a:tailEnd type="triangle"/>
+          </a:ln>
+        </p:spPr>
+        <p:style>
+          <a:lnRef idx="1">
+            <a:schemeClr val="dk1"/>
+          </a:lnRef>
+          <a:fillRef idx="0">
+            <a:schemeClr val="dk1"/>
+          </a:fillRef>
+          <a:effectRef idx="0">
+            <a:schemeClr val="dk1"/>
+          </a:effectRef>
+          <a:fontRef idx="minor">
+            <a:schemeClr val="tx1"/>
+          </a:fontRef>
+        </p:style>
+      </p:cxnSp>
+      <p:sp>
+        <p:nvSpPr>
+          <p:cNvPr id="29" name="橢圓 28"/>
+          <p:cNvSpPr/>
+          <p:nvPr/>
+        </p:nvSpPr>
+        <p:spPr>
+          <a:xfrm>
+            <a:off x="7166897" y="3562866"/>
+            <a:ext cx="1146629" cy="1088571"/>
+          </a:xfrm>
+          <a:prstGeom prst="ellipse">
+            <a:avLst/>
+          </a:prstGeom>
+        </p:spPr>
+        <p:style>
+          <a:lnRef idx="2">
+            <a:schemeClr val="accent1">
+              <a:shade val="50000"/>
+            </a:schemeClr>
+          </a:lnRef>
+          <a:fillRef idx="1">
+            <a:schemeClr val="accent1"/>
+          </a:fillRef>
+          <a:effectRef idx="0">
+            <a:schemeClr val="accent1"/>
+          </a:effectRef>
+          <a:fontRef idx="minor">
+            <a:schemeClr val="lt1"/>
+          </a:fontRef>
+        </p:style>
+        <p:txBody>
+          <a:bodyPr rtlCol="0" anchor="ctr"/>
+          <a:lstStyle/>
+          <a:p>
+            <a:pPr algn="ctr"/>
+            <a:r>
+              <a:rPr lang="en-US" altLang="zh-TW" sz="2800" dirty="0" smtClean="0"/>
+              <a:t>6</a:t>
+            </a:r>
+            <a:endParaRPr lang="zh-TW" altLang="en-US" sz="2800" dirty="0"/>
+          </a:p>
+        </p:txBody>
+      </p:sp>
+      <p:sp>
+        <p:nvSpPr>
+          <p:cNvPr id="30" name="橢圓 29"/>
+          <p:cNvSpPr/>
+          <p:nvPr/>
+        </p:nvSpPr>
+        <p:spPr>
+          <a:xfrm>
+            <a:off x="6689320" y="5200038"/>
+            <a:ext cx="1146629" cy="1088571"/>
+          </a:xfrm>
+          <a:prstGeom prst="ellipse">
+            <a:avLst/>
+          </a:prstGeom>
+        </p:spPr>
+        <p:style>
+          <a:lnRef idx="2">
+            <a:schemeClr val="accent1">
+              <a:shade val="50000"/>
+            </a:schemeClr>
+          </a:lnRef>
+          <a:fillRef idx="1">
+            <a:schemeClr val="accent1"/>
+          </a:fillRef>
+          <a:effectRef idx="0">
+            <a:schemeClr val="accent1"/>
+          </a:effectRef>
+          <a:fontRef idx="minor">
+            <a:schemeClr val="lt1"/>
+          </a:fontRef>
+        </p:style>
+        <p:txBody>
+          <a:bodyPr rtlCol="0" anchor="ctr"/>
+          <a:lstStyle/>
+          <a:p>
+            <a:pPr algn="ctr"/>
+            <a:r>
+              <a:rPr lang="en-US" altLang="zh-TW" sz="2800" dirty="0" smtClean="0"/>
+              <a:t>12</a:t>
+            </a:r>
+            <a:endParaRPr lang="zh-TW" altLang="en-US" sz="2800" dirty="0"/>
+          </a:p>
+        </p:txBody>
+      </p:sp>
+      <p:sp>
+        <p:nvSpPr>
+          <p:cNvPr id="31" name="橢圓 30"/>
+          <p:cNvSpPr/>
+          <p:nvPr/>
+        </p:nvSpPr>
+        <p:spPr>
+          <a:xfrm>
+            <a:off x="7936322" y="5200038"/>
+            <a:ext cx="1146629" cy="1088571"/>
+          </a:xfrm>
+          <a:prstGeom prst="ellipse">
+            <a:avLst/>
+          </a:prstGeom>
+        </p:spPr>
+        <p:style>
+          <a:lnRef idx="2">
+            <a:schemeClr val="accent1">
+              <a:shade val="50000"/>
+            </a:schemeClr>
+          </a:lnRef>
+          <a:fillRef idx="1">
+            <a:schemeClr val="accent1"/>
+          </a:fillRef>
+          <a:effectRef idx="0">
+            <a:schemeClr val="accent1"/>
+          </a:effectRef>
+          <a:fontRef idx="minor">
+            <a:schemeClr val="lt1"/>
+          </a:fontRef>
+        </p:style>
+        <p:txBody>
+          <a:bodyPr rtlCol="0" anchor="ctr"/>
+          <a:lstStyle/>
+          <a:p>
+            <a:pPr algn="ctr"/>
+            <a:r>
+              <a:rPr lang="en-US" altLang="zh-TW" sz="2800" dirty="0" smtClean="0"/>
+              <a:t>13</a:t>
+            </a:r>
+            <a:endParaRPr lang="zh-TW" altLang="en-US" sz="2800" dirty="0"/>
+          </a:p>
+        </p:txBody>
+      </p:sp>
+      <p:cxnSp>
+        <p:nvCxnSpPr>
+          <p:cNvPr id="32" name="直線單箭頭接點 31"/>
+          <p:cNvCxnSpPr/>
+          <p:nvPr/>
+        </p:nvCxnSpPr>
+        <p:spPr>
+          <a:xfrm flipH="1">
+            <a:off x="7138456" y="4659995"/>
+            <a:ext cx="459737" cy="542503"/>
+          </a:xfrm>
+          <a:prstGeom prst="straightConnector1">
+            <a:avLst/>
+          </a:prstGeom>
+          <a:ln>
+            <a:tailEnd type="triangle"/>
+          </a:ln>
+        </p:spPr>
+        <p:style>
+          <a:lnRef idx="1">
+            <a:schemeClr val="dk1"/>
+          </a:lnRef>
+          <a:fillRef idx="0">
+            <a:schemeClr val="dk1"/>
+          </a:fillRef>
+          <a:effectRef idx="0">
+            <a:schemeClr val="dk1"/>
+          </a:effectRef>
+          <a:fontRef idx="minor">
+            <a:schemeClr val="tx1"/>
+          </a:fontRef>
+        </p:style>
+      </p:cxnSp>
+      <p:cxnSp>
+        <p:nvCxnSpPr>
+          <p:cNvPr id="33" name="直線單箭頭接點 32"/>
+          <p:cNvCxnSpPr/>
+          <p:nvPr/>
+        </p:nvCxnSpPr>
+        <p:spPr>
+          <a:xfrm>
+            <a:off x="8031075" y="4651437"/>
+            <a:ext cx="465023" cy="503662"/>
+          </a:xfrm>
+          <a:prstGeom prst="straightConnector1">
+            <a:avLst/>
+          </a:prstGeom>
+          <a:ln>
+            <a:tailEnd type="triangle"/>
+          </a:ln>
+        </p:spPr>
+        <p:style>
+          <a:lnRef idx="1">
+            <a:schemeClr val="dk1"/>
+          </a:lnRef>
+          <a:fillRef idx="0">
+            <a:schemeClr val="dk1"/>
+          </a:fillRef>
+          <a:effectRef idx="0">
+            <a:schemeClr val="dk1"/>
+          </a:effectRef>
+          <a:fontRef idx="minor">
+            <a:schemeClr val="tx1"/>
+          </a:fontRef>
+        </p:style>
+      </p:cxnSp>
+      <p:sp>
+        <p:nvSpPr>
+          <p:cNvPr id="35" name="橢圓 34"/>
+          <p:cNvSpPr/>
+          <p:nvPr/>
+        </p:nvSpPr>
+        <p:spPr>
+          <a:xfrm>
+            <a:off x="599259" y="5200038"/>
+            <a:ext cx="1146629" cy="1088571"/>
+          </a:xfrm>
+          <a:prstGeom prst="ellipse">
+            <a:avLst/>
+          </a:prstGeom>
+        </p:spPr>
+        <p:style>
+          <a:lnRef idx="2">
+            <a:schemeClr val="accent1">
+              <a:shade val="50000"/>
+            </a:schemeClr>
+          </a:lnRef>
+          <a:fillRef idx="1">
+            <a:schemeClr val="accent1"/>
+          </a:fillRef>
+          <a:effectRef idx="0">
+            <a:schemeClr val="accent1"/>
+          </a:effectRef>
+          <a:fontRef idx="minor">
+            <a:schemeClr val="lt1"/>
+          </a:fontRef>
+        </p:style>
+        <p:txBody>
+          <a:bodyPr rtlCol="0" anchor="ctr"/>
+          <a:lstStyle/>
+          <a:p>
+            <a:pPr algn="ctr"/>
+            <a:r>
+              <a:rPr lang="en-US" altLang="zh-TW" sz="2800" dirty="0" smtClean="0"/>
+              <a:t>8</a:t>
+            </a:r>
+            <a:endParaRPr lang="zh-TW" altLang="en-US" sz="2800" dirty="0"/>
+          </a:p>
+        </p:txBody>
+      </p:sp>
+      <p:sp>
+        <p:nvSpPr>
+          <p:cNvPr id="36" name="橢圓 35"/>
+          <p:cNvSpPr/>
+          <p:nvPr/>
+        </p:nvSpPr>
+        <p:spPr>
+          <a:xfrm>
+            <a:off x="2113531" y="5200038"/>
+            <a:ext cx="1146629" cy="1088571"/>
+          </a:xfrm>
+          <a:prstGeom prst="ellipse">
+            <a:avLst/>
+          </a:prstGeom>
+        </p:spPr>
+        <p:style>
+          <a:lnRef idx="2">
+            <a:schemeClr val="accent1">
+              <a:shade val="50000"/>
+            </a:schemeClr>
+          </a:lnRef>
+          <a:fillRef idx="1">
+            <a:schemeClr val="accent1"/>
+          </a:fillRef>
+          <a:effectRef idx="0">
+            <a:schemeClr val="accent1"/>
+          </a:effectRef>
+          <a:fontRef idx="minor">
+            <a:schemeClr val="lt1"/>
+          </a:fontRef>
+        </p:style>
+        <p:txBody>
+          <a:bodyPr rtlCol="0" anchor="ctr"/>
+          <a:lstStyle/>
+          <a:p>
+            <a:pPr algn="ctr"/>
+            <a:r>
+              <a:rPr lang="en-US" altLang="zh-TW" sz="2800" dirty="0" smtClean="0"/>
+              <a:t>9</a:t>
+            </a:r>
+            <a:endParaRPr lang="zh-TW" altLang="en-US" sz="2800" dirty="0"/>
+          </a:p>
+        </p:txBody>
+      </p:sp>
+      <p:sp>
+        <p:nvSpPr>
+          <p:cNvPr id="37" name="文字方塊 36"/>
+          <p:cNvSpPr txBox="1"/>
+          <p:nvPr/>
+        </p:nvSpPr>
+        <p:spPr>
+          <a:xfrm>
+            <a:off x="855021" y="414254"/>
+            <a:ext cx="2633541" cy="369332"/>
+          </a:xfrm>
+          <a:prstGeom prst="rect">
+            <a:avLst/>
+          </a:prstGeom>
+          <a:noFill/>
+        </p:spPr>
+        <p:txBody>
+          <a:bodyPr wrap="none" rtlCol="0">
+            <a:spAutoFit/>
+          </a:bodyPr>
+          <a:lstStyle/>
+          <a:p>
+            <a:r>
+              <a:rPr lang="zh-TW" altLang="en-US" b="1" dirty="0" smtClean="0">
+                <a:latin typeface="微軟正黑體" panose="020B0604030504040204" pitchFamily="34" charset="-120"/>
+                <a:ea typeface="微軟正黑體" panose="020B0604030504040204" pitchFamily="34" charset="-120"/>
+              </a:rPr>
+              <a:t>完滿二元</a:t>
+            </a:r>
+            <a:r>
+              <a:rPr lang="zh-TW" altLang="en-US" b="1" dirty="0" smtClean="0">
+                <a:latin typeface="微軟正黑體" panose="020B0604030504040204" pitchFamily="34" charset="-120"/>
+                <a:ea typeface="微軟正黑體" panose="020B0604030504040204" pitchFamily="34" charset="-120"/>
+              </a:rPr>
+              <a:t>樹 </a:t>
+            </a:r>
+            <a:r>
+              <a:rPr lang="en-US" altLang="zh-TW" b="1" dirty="0" smtClean="0">
+                <a:latin typeface="微軟正黑體" panose="020B0604030504040204" pitchFamily="34" charset="-120"/>
+                <a:ea typeface="微軟正黑體" panose="020B0604030504040204" pitchFamily="34" charset="-120"/>
+              </a:rPr>
+              <a:t>Binary Tree</a:t>
+            </a:r>
+            <a:endParaRPr lang="zh-TW" altLang="en-US" b="1" dirty="0">
+              <a:latin typeface="微軟正黑體" panose="020B0604030504040204" pitchFamily="34" charset="-120"/>
+              <a:ea typeface="微軟正黑體" panose="020B0604030504040204" pitchFamily="34" charset="-120"/>
+            </a:endParaRPr>
+          </a:p>
+        </p:txBody>
+      </p:sp>
+    </p:spTree>
+    <p:extLst>
+      <p:ext uri="{BB962C8B-B14F-4D97-AF65-F5344CB8AC3E}">
+        <p14:creationId xmlns:p14="http://schemas.microsoft.com/office/powerpoint/2010/main" val="562374207"/>
+      </p:ext>
+    </p:extLst>
+  </p:cSld>
+  <p:clrMapOvr>
+    <a:masterClrMapping/>
+  </p:clrMapOvr>
+</p:sld>
+</file>
+
+<file path=ppt/slides/slide4.xml><?xml version="1.0" encoding="utf-8"?>
+<p:sld xmlns:a="http://schemas.openxmlformats.org/drawingml/2006/main" xmlns:r="http://schemas.openxmlformats.org/officeDocument/2006/relationships" xmlns:p="http://schemas.openxmlformats.org/presentationml/2006/main">
+  <p:cSld>
+    <p:spTree>
+      <p:nvGrpSpPr>
+        <p:cNvPr id="1" name=""/>
+        <p:cNvGrpSpPr/>
+        <p:nvPr/>
+      </p:nvGrpSpPr>
+      <p:grpSpPr>
+        <a:xfrm>
+          <a:off x="0" y="0"/>
+          <a:ext cx="0" cy="0"/>
+          <a:chOff x="0" y="0"/>
+          <a:chExt cx="0" cy="0"/>
+        </a:xfrm>
+      </p:grpSpPr>
+      <mc:AlternateContent xmlns:mc="http://schemas.openxmlformats.org/markup-compatibility/2006">
+        <mc:Choice xmlns:a14="http://schemas.microsoft.com/office/drawing/2010/main" Requires="a14">
+          <p:sp>
+            <p:nvSpPr>
+              <p:cNvPr id="4" name="文字方塊 3"/>
+              <p:cNvSpPr txBox="1"/>
+              <p:nvPr/>
+            </p:nvSpPr>
+            <p:spPr>
+              <a:xfrm>
+                <a:off x="857634" y="939268"/>
+                <a:ext cx="2507720" cy="1297599"/>
+              </a:xfrm>
+              <a:prstGeom prst="rect">
+                <a:avLst/>
+              </a:prstGeom>
+              <a:noFill/>
+            </p:spPr>
+            <p:txBody>
+              <a:bodyPr wrap="square" rtlCol="0">
+                <a:spAutoFit/>
+              </a:bodyPr>
+              <a:lstStyle/>
+              <a:p>
+                <a14:m>
+                  <m:oMath xmlns:m="http://schemas.openxmlformats.org/officeDocument/2006/math">
+                    <m:sSup>
+                      <m:sSupPr>
+                        <m:ctrlPr>
+                          <a:rPr lang="en-US" altLang="zh-TW" i="1" smtClean="0">
+                            <a:latin typeface="Cambria Math" panose="02040503050406030204" pitchFamily="18" charset="0"/>
+                          </a:rPr>
+                        </m:ctrlPr>
+                      </m:sSupPr>
+                      <m:e>
+                        <m:r>
+                          <a:rPr lang="zh-TW" altLang="en-US" b="1" i="1">
+                            <a:latin typeface="Cambria Math" panose="02040503050406030204" pitchFamily="18" charset="0"/>
+                          </a:rPr>
+                          <m:t>公式</m:t>
+                        </m:r>
+                        <m:r>
+                          <a:rPr lang="en-US" altLang="zh-TW" b="1" i="1" smtClean="0">
+                            <a:latin typeface="Cambria Math" panose="02040503050406030204" pitchFamily="18" charset="0"/>
+                          </a:rPr>
+                          <m:t>:</m:t>
+                        </m:r>
+                        <m:r>
+                          <a:rPr lang="zh-TW" altLang="en-US" b="1" i="1">
+                            <a:latin typeface="Cambria Math" panose="02040503050406030204" pitchFamily="18" charset="0"/>
+                          </a:rPr>
+                          <m:t> </m:t>
+                        </m:r>
+                        <m:r>
+                          <a:rPr lang="en-US" altLang="zh-TW" b="0" i="1" smtClean="0">
+                            <a:latin typeface="Cambria Math" panose="02040503050406030204" pitchFamily="18" charset="0"/>
+                          </a:rPr>
+                          <m:t>2</m:t>
+                        </m:r>
+                      </m:e>
+                      <m:sup>
+                        <m:r>
+                          <a:rPr lang="en-US" altLang="zh-TW" b="0" i="1" smtClean="0">
+                            <a:latin typeface="Cambria Math" panose="02040503050406030204" pitchFamily="18" charset="0"/>
+                          </a:rPr>
+                          <m:t>h</m:t>
+                        </m:r>
+                      </m:sup>
+                    </m:sSup>
+                    <m:r>
+                      <a:rPr lang="en-US" altLang="zh-TW" b="0" i="1" smtClean="0">
+                        <a:latin typeface="Cambria Math" panose="02040503050406030204" pitchFamily="18" charset="0"/>
+                      </a:rPr>
+                      <m:t> −1</m:t>
+                    </m:r>
+                  </m:oMath>
+                </a14:m>
+                <a:r>
+                  <a:rPr lang="zh-TW" altLang="en-US" dirty="0" smtClean="0"/>
+                  <a:t> </a:t>
+                </a:r>
+                <a:r>
+                  <a:rPr lang="en-US" altLang="zh-TW" dirty="0" smtClean="0"/>
+                  <a:t>&gt;= N</a:t>
+                </a:r>
+              </a:p>
+              <a:p>
+                <a:endParaRPr lang="en-US" altLang="zh-TW" dirty="0" smtClean="0"/>
+              </a:p>
+              <a:p>
+                <a:r>
+                  <a:rPr lang="en-US" altLang="zh-TW" sz="1200" dirty="0">
+                    <a:latin typeface="微軟正黑體" panose="020B0604030504040204" pitchFamily="34" charset="-120"/>
+                    <a:ea typeface="微軟正黑體" panose="020B0604030504040204" pitchFamily="34" charset="-120"/>
+                  </a:rPr>
+                  <a:t>h</a:t>
+                </a:r>
+                <a:r>
+                  <a:rPr lang="en-US" altLang="zh-TW" sz="1200" dirty="0" smtClean="0">
+                    <a:latin typeface="微軟正黑體" panose="020B0604030504040204" pitchFamily="34" charset="-120"/>
+                    <a:ea typeface="微軟正黑體" panose="020B0604030504040204" pitchFamily="34" charset="-120"/>
+                  </a:rPr>
+                  <a:t>: </a:t>
+                </a:r>
+                <a:r>
+                  <a:rPr lang="zh-TW" altLang="en-US" sz="1200" dirty="0" smtClean="0">
+                    <a:latin typeface="微軟正黑體" panose="020B0604030504040204" pitchFamily="34" charset="-120"/>
+                    <a:ea typeface="微軟正黑體" panose="020B0604030504040204" pitchFamily="34" charset="-120"/>
+                  </a:rPr>
+                  <a:t>高度</a:t>
+                </a:r>
+                <a:endParaRPr lang="en-US" altLang="zh-TW" sz="1200" dirty="0" smtClean="0">
+                  <a:latin typeface="微軟正黑體" panose="020B0604030504040204" pitchFamily="34" charset="-120"/>
+                  <a:ea typeface="微軟正黑體" panose="020B0604030504040204" pitchFamily="34" charset="-120"/>
+                </a:endParaRPr>
+              </a:p>
+              <a:p>
+                <a:r>
+                  <a:rPr lang="en-US" altLang="zh-TW" sz="1200" dirty="0">
+                    <a:latin typeface="微軟正黑體" panose="020B0604030504040204" pitchFamily="34" charset="-120"/>
+                    <a:ea typeface="微軟正黑體" panose="020B0604030504040204" pitchFamily="34" charset="-120"/>
+                  </a:rPr>
+                  <a:t>N</a:t>
+                </a:r>
+                <a:r>
+                  <a:rPr lang="en-US" altLang="zh-TW" sz="1200" dirty="0" smtClean="0">
+                    <a:latin typeface="微軟正黑體" panose="020B0604030504040204" pitchFamily="34" charset="-120"/>
+                    <a:ea typeface="微軟正黑體" panose="020B0604030504040204" pitchFamily="34" charset="-120"/>
+                  </a:rPr>
+                  <a:t>: </a:t>
+                </a:r>
+                <a:r>
+                  <a:rPr lang="zh-TW" altLang="en-US" sz="1200" dirty="0" smtClean="0">
+                    <a:latin typeface="微軟正黑體" panose="020B0604030504040204" pitchFamily="34" charset="-120"/>
+                    <a:ea typeface="微軟正黑體" panose="020B0604030504040204" pitchFamily="34" charset="-120"/>
+                  </a:rPr>
+                  <a:t>節點數量</a:t>
+                </a:r>
+                <a:endParaRPr lang="en-US" altLang="zh-TW" sz="1200" dirty="0">
+                  <a:latin typeface="微軟正黑體" panose="020B0604030504040204" pitchFamily="34" charset="-120"/>
+                  <a:ea typeface="微軟正黑體" panose="020B0604030504040204" pitchFamily="34" charset="-120"/>
+                </a:endParaRPr>
+              </a:p>
+              <a:p>
+                <a:endParaRPr lang="zh-TW" altLang="en-US" dirty="0"/>
+              </a:p>
+            </p:txBody>
+          </p:sp>
+        </mc:Choice>
+        <mc:Fallback>
+          <p:sp>
+            <p:nvSpPr>
+              <p:cNvPr id="4" name="文字方塊 3"/>
+              <p:cNvSpPr txBox="1">
+                <a:spLocks noRot="1" noChangeAspect="1" noMove="1" noResize="1" noEditPoints="1" noAdjustHandles="1" noChangeArrowheads="1" noChangeShapeType="1" noTextEdit="1"/>
+              </p:cNvSpPr>
+              <p:nvPr/>
+            </p:nvSpPr>
+            <p:spPr>
+              <a:xfrm>
+                <a:off x="857634" y="939268"/>
+                <a:ext cx="2507720" cy="1297599"/>
+              </a:xfrm>
+              <a:prstGeom prst="rect">
+                <a:avLst/>
+              </a:prstGeom>
+              <a:blipFill>
+                <a:blip r:embed="rId2"/>
+                <a:stretch>
+                  <a:fillRect l="-973" t="-1878"/>
+                </a:stretch>
+              </a:blipFill>
+            </p:spPr>
+            <p:txBody>
+              <a:bodyPr/>
+              <a:lstStyle/>
+              <a:p>
+                <a:r>
+                  <a:rPr lang="zh-TW" altLang="en-US">
+                    <a:noFill/>
+                  </a:rPr>
+                  <a:t> </a:t>
+                </a:r>
+              </a:p>
+            </p:txBody>
+          </p:sp>
+        </mc:Fallback>
+      </mc:AlternateContent>
+      <p:sp>
+        <p:nvSpPr>
+          <p:cNvPr id="37" name="文字方塊 36"/>
+          <p:cNvSpPr txBox="1"/>
+          <p:nvPr/>
+        </p:nvSpPr>
+        <p:spPr>
+          <a:xfrm>
+            <a:off x="855021" y="414254"/>
+            <a:ext cx="2633541" cy="369332"/>
+          </a:xfrm>
+          <a:prstGeom prst="rect">
+            <a:avLst/>
+          </a:prstGeom>
+          <a:noFill/>
+        </p:spPr>
+        <p:txBody>
+          <a:bodyPr wrap="none" rtlCol="0">
+            <a:spAutoFit/>
+          </a:bodyPr>
+          <a:lstStyle/>
+          <a:p>
+            <a:r>
+              <a:rPr lang="zh-TW" altLang="en-US" b="1" dirty="0" smtClean="0">
+                <a:latin typeface="微軟正黑體" panose="020B0604030504040204" pitchFamily="34" charset="-120"/>
+                <a:ea typeface="微軟正黑體" panose="020B0604030504040204" pitchFamily="34" charset="-120"/>
+              </a:rPr>
+              <a:t>完整二元</a:t>
+            </a:r>
+            <a:r>
+              <a:rPr lang="zh-TW" altLang="en-US" b="1" dirty="0" smtClean="0">
+                <a:latin typeface="微軟正黑體" panose="020B0604030504040204" pitchFamily="34" charset="-120"/>
+                <a:ea typeface="微軟正黑體" panose="020B0604030504040204" pitchFamily="34" charset="-120"/>
+              </a:rPr>
+              <a:t>樹 </a:t>
+            </a:r>
+            <a:r>
+              <a:rPr lang="en-US" altLang="zh-TW" b="1" dirty="0" smtClean="0">
+                <a:latin typeface="微軟正黑體" panose="020B0604030504040204" pitchFamily="34" charset="-120"/>
+                <a:ea typeface="微軟正黑體" panose="020B0604030504040204" pitchFamily="34" charset="-120"/>
+              </a:rPr>
+              <a:t>Binary Tree</a:t>
+            </a:r>
+            <a:endParaRPr lang="zh-TW" altLang="en-US" b="1" dirty="0">
+              <a:latin typeface="微軟正黑體" panose="020B0604030504040204" pitchFamily="34" charset="-120"/>
+              <a:ea typeface="微軟正黑體" panose="020B0604030504040204" pitchFamily="34" charset="-120"/>
+            </a:endParaRPr>
+          </a:p>
+        </p:txBody>
+      </p:sp>
+      <p:sp>
+        <p:nvSpPr>
+          <p:cNvPr id="34" name="橢圓 33"/>
+          <p:cNvSpPr/>
+          <p:nvPr/>
+        </p:nvSpPr>
+        <p:spPr>
+          <a:xfrm>
+            <a:off x="2492671" y="1303436"/>
+            <a:ext cx="1146629" cy="1088571"/>
+          </a:xfrm>
+          <a:prstGeom prst="ellipse">
+            <a:avLst/>
+          </a:prstGeom>
+        </p:spPr>
+        <p:style>
+          <a:lnRef idx="2">
+            <a:schemeClr val="accent1">
+              <a:shade val="50000"/>
+            </a:schemeClr>
+          </a:lnRef>
+          <a:fillRef idx="1">
+            <a:schemeClr val="accent1"/>
+          </a:fillRef>
+          <a:effectRef idx="0">
+            <a:schemeClr val="accent1"/>
+          </a:effectRef>
+          <a:fontRef idx="minor">
+            <a:schemeClr val="lt1"/>
+          </a:fontRef>
+        </p:style>
+        <p:txBody>
+          <a:bodyPr rtlCol="0" anchor="ctr"/>
+          <a:lstStyle/>
+          <a:p>
+            <a:pPr algn="ctr"/>
+            <a:r>
+              <a:rPr lang="en-US" altLang="zh-TW" sz="2800" dirty="0"/>
+              <a:t>A</a:t>
+            </a:r>
+            <a:endParaRPr lang="zh-TW" altLang="en-US" sz="2800" dirty="0"/>
+          </a:p>
+        </p:txBody>
+      </p:sp>
+      <p:cxnSp>
+        <p:nvCxnSpPr>
+          <p:cNvPr id="38" name="直線單箭頭接點 37"/>
+          <p:cNvCxnSpPr/>
+          <p:nvPr/>
+        </p:nvCxnSpPr>
+        <p:spPr>
+          <a:xfrm flipH="1">
+            <a:off x="2236445" y="2440546"/>
+            <a:ext cx="573314" cy="861761"/>
+          </a:xfrm>
+          <a:prstGeom prst="straightConnector1">
+            <a:avLst/>
+          </a:prstGeom>
+          <a:ln>
+            <a:tailEnd type="triangle"/>
+          </a:ln>
+        </p:spPr>
+        <p:style>
+          <a:lnRef idx="1">
+            <a:schemeClr val="dk1"/>
+          </a:lnRef>
+          <a:fillRef idx="0">
+            <a:schemeClr val="dk1"/>
+          </a:fillRef>
+          <a:effectRef idx="0">
+            <a:schemeClr val="dk1"/>
+          </a:effectRef>
+          <a:fontRef idx="minor">
+            <a:schemeClr val="tx1"/>
+          </a:fontRef>
+        </p:style>
+      </p:cxnSp>
+      <p:sp>
+        <p:nvSpPr>
+          <p:cNvPr id="39" name="橢圓 38"/>
+          <p:cNvSpPr/>
+          <p:nvPr/>
+        </p:nvSpPr>
+        <p:spPr>
+          <a:xfrm>
+            <a:off x="1413554" y="3339548"/>
+            <a:ext cx="1146629" cy="1088571"/>
+          </a:xfrm>
+          <a:prstGeom prst="ellipse">
+            <a:avLst/>
+          </a:prstGeom>
+        </p:spPr>
+        <p:style>
+          <a:lnRef idx="2">
+            <a:schemeClr val="accent1">
+              <a:shade val="50000"/>
+            </a:schemeClr>
+          </a:lnRef>
+          <a:fillRef idx="1">
+            <a:schemeClr val="accent1"/>
+          </a:fillRef>
+          <a:effectRef idx="0">
+            <a:schemeClr val="accent1"/>
+          </a:effectRef>
+          <a:fontRef idx="minor">
+            <a:schemeClr val="lt1"/>
+          </a:fontRef>
+        </p:style>
+        <p:txBody>
+          <a:bodyPr rtlCol="0" anchor="ctr"/>
+          <a:lstStyle/>
+          <a:p>
+            <a:pPr algn="ctr"/>
+            <a:r>
+              <a:rPr lang="en-US" altLang="zh-TW" sz="2800" dirty="0" smtClean="0"/>
+              <a:t>B</a:t>
+            </a:r>
+            <a:endParaRPr lang="zh-TW" altLang="en-US" sz="2800" dirty="0"/>
+          </a:p>
+        </p:txBody>
+      </p:sp>
+      <p:sp>
+        <p:nvSpPr>
+          <p:cNvPr id="40" name="橢圓 39"/>
+          <p:cNvSpPr/>
+          <p:nvPr/>
+        </p:nvSpPr>
+        <p:spPr>
+          <a:xfrm>
+            <a:off x="583079" y="5432093"/>
+            <a:ext cx="1146629" cy="1088571"/>
+          </a:xfrm>
+          <a:prstGeom prst="ellipse">
+            <a:avLst/>
+          </a:prstGeom>
+        </p:spPr>
+        <p:style>
+          <a:lnRef idx="2">
+            <a:schemeClr val="accent1">
+              <a:shade val="50000"/>
+            </a:schemeClr>
+          </a:lnRef>
+          <a:fillRef idx="1">
+            <a:schemeClr val="accent1"/>
+          </a:fillRef>
+          <a:effectRef idx="0">
+            <a:schemeClr val="accent1"/>
+          </a:effectRef>
+          <a:fontRef idx="minor">
+            <a:schemeClr val="lt1"/>
+          </a:fontRef>
+        </p:style>
+        <p:txBody>
+          <a:bodyPr rtlCol="0" anchor="ctr"/>
+          <a:lstStyle/>
+          <a:p>
+            <a:pPr algn="ctr"/>
+            <a:r>
+              <a:rPr lang="en-US" altLang="zh-TW" sz="2800" dirty="0" smtClean="0"/>
+              <a:t>D</a:t>
+            </a:r>
+            <a:endParaRPr lang="zh-TW" altLang="en-US" sz="2800" dirty="0"/>
+          </a:p>
+        </p:txBody>
+      </p:sp>
+      <p:cxnSp>
+        <p:nvCxnSpPr>
+          <p:cNvPr id="41" name="直線單箭頭接點 40"/>
+          <p:cNvCxnSpPr/>
+          <p:nvPr/>
+        </p:nvCxnSpPr>
+        <p:spPr>
+          <a:xfrm flipH="1">
+            <a:off x="1156394" y="4502600"/>
+            <a:ext cx="573314" cy="861761"/>
+          </a:xfrm>
+          <a:prstGeom prst="straightConnector1">
+            <a:avLst/>
+          </a:prstGeom>
+          <a:ln>
+            <a:tailEnd type="triangle"/>
+          </a:ln>
+        </p:spPr>
+        <p:style>
+          <a:lnRef idx="1">
+            <a:schemeClr val="dk1"/>
+          </a:lnRef>
+          <a:fillRef idx="0">
+            <a:schemeClr val="dk1"/>
+          </a:fillRef>
+          <a:effectRef idx="0">
+            <a:schemeClr val="dk1"/>
+          </a:effectRef>
+          <a:fontRef idx="minor">
+            <a:schemeClr val="tx1"/>
+          </a:fontRef>
+        </p:style>
+      </p:cxnSp>
+      <p:cxnSp>
+        <p:nvCxnSpPr>
+          <p:cNvPr id="42" name="直線單箭頭接點 41"/>
+          <p:cNvCxnSpPr/>
+          <p:nvPr/>
+        </p:nvCxnSpPr>
+        <p:spPr>
+          <a:xfrm>
+            <a:off x="2432850" y="4487957"/>
+            <a:ext cx="510039" cy="865136"/>
+          </a:xfrm>
+          <a:prstGeom prst="straightConnector1">
+            <a:avLst/>
+          </a:prstGeom>
+          <a:ln>
+            <a:tailEnd type="triangle"/>
+          </a:ln>
+        </p:spPr>
+        <p:style>
+          <a:lnRef idx="1">
+            <a:schemeClr val="dk1"/>
+          </a:lnRef>
+          <a:fillRef idx="0">
+            <a:schemeClr val="dk1"/>
+          </a:fillRef>
+          <a:effectRef idx="0">
+            <a:schemeClr val="dk1"/>
+          </a:effectRef>
+          <a:fontRef idx="minor">
+            <a:schemeClr val="tx1"/>
+          </a:fontRef>
+        </p:style>
+      </p:cxnSp>
+      <p:sp>
+        <p:nvSpPr>
+          <p:cNvPr id="43" name="橢圓 42"/>
+          <p:cNvSpPr/>
+          <p:nvPr/>
+        </p:nvSpPr>
+        <p:spPr>
+          <a:xfrm>
+            <a:off x="2369574" y="5364361"/>
+            <a:ext cx="1146629" cy="1088571"/>
+          </a:xfrm>
+          <a:prstGeom prst="ellipse">
+            <a:avLst/>
+          </a:prstGeom>
+        </p:spPr>
+        <p:style>
+          <a:lnRef idx="2">
+            <a:schemeClr val="accent1">
+              <a:shade val="50000"/>
+            </a:schemeClr>
+          </a:lnRef>
+          <a:fillRef idx="1">
+            <a:schemeClr val="accent1"/>
+          </a:fillRef>
+          <a:effectRef idx="0">
+            <a:schemeClr val="accent1"/>
+          </a:effectRef>
+          <a:fontRef idx="minor">
+            <a:schemeClr val="lt1"/>
+          </a:fontRef>
+        </p:style>
+        <p:txBody>
+          <a:bodyPr rtlCol="0" anchor="ctr"/>
+          <a:lstStyle/>
+          <a:p>
+            <a:pPr algn="ctr"/>
+            <a:r>
+              <a:rPr lang="en-US" altLang="zh-TW" sz="2800" dirty="0" smtClean="0"/>
+              <a:t>E</a:t>
+            </a:r>
+            <a:endParaRPr lang="zh-TW" altLang="en-US" sz="2800" dirty="0"/>
+          </a:p>
+        </p:txBody>
+      </p:sp>
+      <p:sp>
+        <p:nvSpPr>
+          <p:cNvPr id="44" name="橢圓 43"/>
+          <p:cNvSpPr/>
+          <p:nvPr/>
+        </p:nvSpPr>
+        <p:spPr>
+          <a:xfrm>
+            <a:off x="3465708" y="3222952"/>
+            <a:ext cx="1146629" cy="1088571"/>
+          </a:xfrm>
+          <a:prstGeom prst="ellipse">
+            <a:avLst/>
+          </a:prstGeom>
+        </p:spPr>
+        <p:style>
+          <a:lnRef idx="2">
+            <a:schemeClr val="accent1">
+              <a:shade val="50000"/>
+            </a:schemeClr>
+          </a:lnRef>
+          <a:fillRef idx="1">
+            <a:schemeClr val="accent1"/>
+          </a:fillRef>
+          <a:effectRef idx="0">
+            <a:schemeClr val="accent1"/>
+          </a:effectRef>
+          <a:fontRef idx="minor">
+            <a:schemeClr val="lt1"/>
+          </a:fontRef>
+        </p:style>
+        <p:txBody>
+          <a:bodyPr rtlCol="0" anchor="ctr"/>
+          <a:lstStyle/>
+          <a:p>
+            <a:pPr algn="ctr"/>
+            <a:r>
+              <a:rPr lang="en-US" altLang="zh-TW" sz="2800" dirty="0" smtClean="0"/>
+              <a:t>C</a:t>
+            </a:r>
+            <a:endParaRPr lang="zh-TW" altLang="en-US" sz="2800" dirty="0"/>
+          </a:p>
+        </p:txBody>
+      </p:sp>
+      <p:cxnSp>
+        <p:nvCxnSpPr>
+          <p:cNvPr id="45" name="直線單箭頭接點 44"/>
+          <p:cNvCxnSpPr/>
+          <p:nvPr/>
+        </p:nvCxnSpPr>
+        <p:spPr>
+          <a:xfrm>
+            <a:off x="3358992" y="2437171"/>
+            <a:ext cx="510039" cy="865136"/>
+          </a:xfrm>
+          <a:prstGeom prst="straightConnector1">
+            <a:avLst/>
+          </a:prstGeom>
+          <a:ln>
+            <a:tailEnd type="triangle"/>
+          </a:ln>
+        </p:spPr>
+        <p:style>
+          <a:lnRef idx="1">
+            <a:schemeClr val="dk1"/>
+          </a:lnRef>
+          <a:fillRef idx="0">
+            <a:schemeClr val="dk1"/>
+          </a:fillRef>
+          <a:effectRef idx="0">
+            <a:schemeClr val="dk1"/>
+          </a:effectRef>
+          <a:fontRef idx="minor">
+            <a:schemeClr val="tx1"/>
+          </a:fontRef>
+        </p:style>
+      </p:cxnSp>
+      <p:cxnSp>
+        <p:nvCxnSpPr>
+          <p:cNvPr id="46" name="直線單箭頭接點 45"/>
+          <p:cNvCxnSpPr/>
+          <p:nvPr/>
+        </p:nvCxnSpPr>
+        <p:spPr>
+          <a:xfrm flipH="1">
+            <a:off x="4039022" y="4428119"/>
+            <a:ext cx="177869" cy="924974"/>
+          </a:xfrm>
+          <a:prstGeom prst="straightConnector1">
+            <a:avLst/>
+          </a:prstGeom>
+          <a:ln>
+            <a:tailEnd type="triangle"/>
+          </a:ln>
+        </p:spPr>
+        <p:style>
+          <a:lnRef idx="1">
+            <a:schemeClr val="dk1"/>
+          </a:lnRef>
+          <a:fillRef idx="0">
+            <a:schemeClr val="dk1"/>
+          </a:fillRef>
+          <a:effectRef idx="0">
+            <a:schemeClr val="dk1"/>
+          </a:effectRef>
+          <a:fontRef idx="minor">
+            <a:schemeClr val="tx1"/>
+          </a:fontRef>
+        </p:style>
+      </p:cxnSp>
+      <p:sp>
+        <p:nvSpPr>
+          <p:cNvPr id="47" name="橢圓 46"/>
+          <p:cNvSpPr/>
+          <p:nvPr/>
+        </p:nvSpPr>
+        <p:spPr>
+          <a:xfrm>
+            <a:off x="3780930" y="5353093"/>
+            <a:ext cx="1146629" cy="1088571"/>
+          </a:xfrm>
+          <a:prstGeom prst="ellipse">
+            <a:avLst/>
+          </a:prstGeom>
+        </p:spPr>
+        <p:style>
+          <a:lnRef idx="2">
+            <a:schemeClr val="accent1">
+              <a:shade val="50000"/>
+            </a:schemeClr>
+          </a:lnRef>
+          <a:fillRef idx="1">
+            <a:schemeClr val="accent1"/>
+          </a:fillRef>
+          <a:effectRef idx="0">
+            <a:schemeClr val="accent1"/>
+          </a:effectRef>
+          <a:fontRef idx="minor">
+            <a:schemeClr val="lt1"/>
+          </a:fontRef>
+        </p:style>
+        <p:txBody>
+          <a:bodyPr rtlCol="0" anchor="ctr"/>
+          <a:lstStyle/>
+          <a:p>
+            <a:pPr algn="ctr"/>
+            <a:r>
+              <a:rPr lang="en-US" altLang="zh-TW" sz="2800" dirty="0"/>
+              <a:t>F</a:t>
+            </a:r>
+            <a:endParaRPr lang="zh-TW" altLang="en-US" sz="2800" dirty="0"/>
+          </a:p>
+        </p:txBody>
+      </p:sp>
+      <p:sp>
+        <p:nvSpPr>
+          <p:cNvPr id="48" name="文字方塊 47"/>
+          <p:cNvSpPr txBox="1"/>
+          <p:nvPr/>
+        </p:nvSpPr>
+        <p:spPr>
+          <a:xfrm>
+            <a:off x="1946413" y="6464200"/>
+            <a:ext cx="1627369" cy="369332"/>
+          </a:xfrm>
+          <a:prstGeom prst="rect">
+            <a:avLst/>
+          </a:prstGeom>
+          <a:noFill/>
+        </p:spPr>
+        <p:txBody>
+          <a:bodyPr wrap="none" rtlCol="0">
+            <a:spAutoFit/>
+          </a:bodyPr>
+          <a:lstStyle/>
+          <a:p>
+            <a:r>
+              <a:rPr lang="zh-TW" altLang="en-US" b="1" dirty="0">
+                <a:latin typeface="微軟正黑體" panose="020B0604030504040204" pitchFamily="34" charset="-120"/>
+                <a:ea typeface="微軟正黑體" panose="020B0604030504040204" pitchFamily="34" charset="-120"/>
+              </a:rPr>
+              <a:t>為</a:t>
+            </a:r>
+            <a:r>
+              <a:rPr lang="zh-TW" altLang="en-US" b="1" dirty="0" smtClean="0">
+                <a:latin typeface="微軟正黑體" panose="020B0604030504040204" pitchFamily="34" charset="-120"/>
+                <a:ea typeface="微軟正黑體" panose="020B0604030504040204" pitchFamily="34" charset="-120"/>
+              </a:rPr>
+              <a:t>完整二元樹 </a:t>
+            </a:r>
+            <a:endParaRPr lang="zh-TW" altLang="en-US" b="1" dirty="0">
+              <a:latin typeface="微軟正黑體" panose="020B0604030504040204" pitchFamily="34" charset="-120"/>
+              <a:ea typeface="微軟正黑體" panose="020B0604030504040204" pitchFamily="34" charset="-120"/>
+            </a:endParaRPr>
+          </a:p>
+        </p:txBody>
+      </p:sp>
+      <p:sp>
+        <p:nvSpPr>
+          <p:cNvPr id="49" name="橢圓 48"/>
+          <p:cNvSpPr/>
+          <p:nvPr/>
+        </p:nvSpPr>
+        <p:spPr>
+          <a:xfrm>
+            <a:off x="7432213" y="1045019"/>
+            <a:ext cx="1146629" cy="1088571"/>
+          </a:xfrm>
+          <a:prstGeom prst="ellipse">
+            <a:avLst/>
+          </a:prstGeom>
+        </p:spPr>
+        <p:style>
+          <a:lnRef idx="2">
+            <a:schemeClr val="accent1">
+              <a:shade val="50000"/>
+            </a:schemeClr>
+          </a:lnRef>
+          <a:fillRef idx="1">
+            <a:schemeClr val="accent1"/>
+          </a:fillRef>
+          <a:effectRef idx="0">
+            <a:schemeClr val="accent1"/>
+          </a:effectRef>
+          <a:fontRef idx="minor">
+            <a:schemeClr val="lt1"/>
+          </a:fontRef>
+        </p:style>
+        <p:txBody>
+          <a:bodyPr rtlCol="0" anchor="ctr"/>
+          <a:lstStyle/>
+          <a:p>
+            <a:pPr algn="ctr"/>
+            <a:r>
+              <a:rPr lang="en-US" altLang="zh-TW" sz="2800" dirty="0"/>
+              <a:t>A</a:t>
+            </a:r>
+            <a:endParaRPr lang="zh-TW" altLang="en-US" sz="2800" dirty="0"/>
+          </a:p>
+        </p:txBody>
+      </p:sp>
+      <p:cxnSp>
+        <p:nvCxnSpPr>
+          <p:cNvPr id="50" name="直線單箭頭接點 49"/>
+          <p:cNvCxnSpPr/>
+          <p:nvPr/>
+        </p:nvCxnSpPr>
+        <p:spPr>
+          <a:xfrm flipH="1">
+            <a:off x="7175987" y="2182129"/>
+            <a:ext cx="573314" cy="861761"/>
+          </a:xfrm>
+          <a:prstGeom prst="straightConnector1">
+            <a:avLst/>
+          </a:prstGeom>
+          <a:ln>
+            <a:tailEnd type="triangle"/>
+          </a:ln>
+        </p:spPr>
+        <p:style>
+          <a:lnRef idx="1">
+            <a:schemeClr val="dk1"/>
+          </a:lnRef>
+          <a:fillRef idx="0">
+            <a:schemeClr val="dk1"/>
+          </a:fillRef>
+          <a:effectRef idx="0">
+            <a:schemeClr val="dk1"/>
+          </a:effectRef>
+          <a:fontRef idx="minor">
+            <a:schemeClr val="tx1"/>
+          </a:fontRef>
+        </p:style>
+      </p:cxnSp>
+      <p:sp>
+        <p:nvSpPr>
+          <p:cNvPr id="51" name="橢圓 50"/>
+          <p:cNvSpPr/>
+          <p:nvPr/>
+        </p:nvSpPr>
+        <p:spPr>
+          <a:xfrm>
+            <a:off x="6353096" y="3081131"/>
+            <a:ext cx="1146629" cy="1088571"/>
+          </a:xfrm>
+          <a:prstGeom prst="ellipse">
+            <a:avLst/>
+          </a:prstGeom>
+        </p:spPr>
+        <p:style>
+          <a:lnRef idx="2">
+            <a:schemeClr val="accent1">
+              <a:shade val="50000"/>
+            </a:schemeClr>
+          </a:lnRef>
+          <a:fillRef idx="1">
+            <a:schemeClr val="accent1"/>
+          </a:fillRef>
+          <a:effectRef idx="0">
+            <a:schemeClr val="accent1"/>
+          </a:effectRef>
+          <a:fontRef idx="minor">
+            <a:schemeClr val="lt1"/>
+          </a:fontRef>
+        </p:style>
+        <p:txBody>
+          <a:bodyPr rtlCol="0" anchor="ctr"/>
+          <a:lstStyle/>
+          <a:p>
+            <a:pPr algn="ctr"/>
+            <a:r>
+              <a:rPr lang="en-US" altLang="zh-TW" sz="2800" dirty="0" smtClean="0"/>
+              <a:t>B</a:t>
+            </a:r>
+            <a:endParaRPr lang="zh-TW" altLang="en-US" sz="2800" dirty="0"/>
+          </a:p>
+        </p:txBody>
+      </p:sp>
+      <p:sp>
+        <p:nvSpPr>
+          <p:cNvPr id="52" name="橢圓 51"/>
+          <p:cNvSpPr/>
+          <p:nvPr/>
+        </p:nvSpPr>
+        <p:spPr>
+          <a:xfrm>
+            <a:off x="5522621" y="5173676"/>
+            <a:ext cx="1146629" cy="1088571"/>
+          </a:xfrm>
+          <a:prstGeom prst="ellipse">
+            <a:avLst/>
+          </a:prstGeom>
+        </p:spPr>
+        <p:style>
+          <a:lnRef idx="2">
+            <a:schemeClr val="accent1">
+              <a:shade val="50000"/>
+            </a:schemeClr>
+          </a:lnRef>
+          <a:fillRef idx="1">
+            <a:schemeClr val="accent1"/>
+          </a:fillRef>
+          <a:effectRef idx="0">
+            <a:schemeClr val="accent1"/>
+          </a:effectRef>
+          <a:fontRef idx="minor">
+            <a:schemeClr val="lt1"/>
+          </a:fontRef>
+        </p:style>
+        <p:txBody>
+          <a:bodyPr rtlCol="0" anchor="ctr"/>
+          <a:lstStyle/>
+          <a:p>
+            <a:pPr algn="ctr"/>
+            <a:r>
+              <a:rPr lang="en-US" altLang="zh-TW" sz="2800" dirty="0" smtClean="0"/>
+              <a:t>D</a:t>
+            </a:r>
+            <a:endParaRPr lang="zh-TW" altLang="en-US" sz="2800" dirty="0"/>
+          </a:p>
+        </p:txBody>
+      </p:sp>
+      <p:cxnSp>
+        <p:nvCxnSpPr>
+          <p:cNvPr id="53" name="直線單箭頭接點 52"/>
+          <p:cNvCxnSpPr/>
+          <p:nvPr/>
+        </p:nvCxnSpPr>
+        <p:spPr>
+          <a:xfrm flipH="1">
+            <a:off x="6095936" y="4244183"/>
+            <a:ext cx="573314" cy="861761"/>
+          </a:xfrm>
+          <a:prstGeom prst="straightConnector1">
+            <a:avLst/>
+          </a:prstGeom>
+          <a:ln>
+            <a:tailEnd type="triangle"/>
+          </a:ln>
+        </p:spPr>
+        <p:style>
+          <a:lnRef idx="1">
+            <a:schemeClr val="dk1"/>
+          </a:lnRef>
+          <a:fillRef idx="0">
+            <a:schemeClr val="dk1"/>
+          </a:fillRef>
+          <a:effectRef idx="0">
+            <a:schemeClr val="dk1"/>
+          </a:effectRef>
+          <a:fontRef idx="minor">
+            <a:schemeClr val="tx1"/>
+          </a:fontRef>
+        </p:style>
+      </p:cxnSp>
+      <p:cxnSp>
+        <p:nvCxnSpPr>
+          <p:cNvPr id="54" name="直線單箭頭接點 53"/>
+          <p:cNvCxnSpPr/>
+          <p:nvPr/>
+        </p:nvCxnSpPr>
+        <p:spPr>
+          <a:xfrm>
+            <a:off x="7372392" y="4229540"/>
+            <a:ext cx="510039" cy="865136"/>
+          </a:xfrm>
+          <a:prstGeom prst="straightConnector1">
+            <a:avLst/>
+          </a:prstGeom>
+          <a:ln>
+            <a:tailEnd type="triangle"/>
+          </a:ln>
+        </p:spPr>
+        <p:style>
+          <a:lnRef idx="1">
+            <a:schemeClr val="dk1"/>
+          </a:lnRef>
+          <a:fillRef idx="0">
+            <a:schemeClr val="dk1"/>
+          </a:fillRef>
+          <a:effectRef idx="0">
+            <a:schemeClr val="dk1"/>
+          </a:effectRef>
+          <a:fontRef idx="minor">
+            <a:schemeClr val="tx1"/>
+          </a:fontRef>
+        </p:style>
+      </p:cxnSp>
+      <p:sp>
+        <p:nvSpPr>
+          <p:cNvPr id="55" name="橢圓 54"/>
+          <p:cNvSpPr/>
+          <p:nvPr/>
+        </p:nvSpPr>
+        <p:spPr>
+          <a:xfrm>
+            <a:off x="7309116" y="5105944"/>
+            <a:ext cx="1146629" cy="1088571"/>
+          </a:xfrm>
+          <a:prstGeom prst="ellipse">
+            <a:avLst/>
+          </a:prstGeom>
+        </p:spPr>
+        <p:style>
+          <a:lnRef idx="2">
+            <a:schemeClr val="accent1">
+              <a:shade val="50000"/>
+            </a:schemeClr>
+          </a:lnRef>
+          <a:fillRef idx="1">
+            <a:schemeClr val="accent1"/>
+          </a:fillRef>
+          <a:effectRef idx="0">
+            <a:schemeClr val="accent1"/>
+          </a:effectRef>
+          <a:fontRef idx="minor">
+            <a:schemeClr val="lt1"/>
+          </a:fontRef>
+        </p:style>
+        <p:txBody>
+          <a:bodyPr rtlCol="0" anchor="ctr"/>
+          <a:lstStyle/>
+          <a:p>
+            <a:pPr algn="ctr"/>
+            <a:r>
+              <a:rPr lang="en-US" altLang="zh-TW" sz="2800" dirty="0" smtClean="0"/>
+              <a:t>E</a:t>
+            </a:r>
+            <a:endParaRPr lang="zh-TW" altLang="en-US" sz="2800" dirty="0"/>
+          </a:p>
+        </p:txBody>
+      </p:sp>
+      <p:sp>
+        <p:nvSpPr>
+          <p:cNvPr id="56" name="橢圓 55"/>
+          <p:cNvSpPr/>
+          <p:nvPr/>
+        </p:nvSpPr>
+        <p:spPr>
+          <a:xfrm>
+            <a:off x="8405250" y="2964535"/>
+            <a:ext cx="1146629" cy="1088571"/>
+          </a:xfrm>
+          <a:prstGeom prst="ellipse">
+            <a:avLst/>
+          </a:prstGeom>
+        </p:spPr>
+        <p:style>
+          <a:lnRef idx="2">
+            <a:schemeClr val="accent1">
+              <a:shade val="50000"/>
+            </a:schemeClr>
+          </a:lnRef>
+          <a:fillRef idx="1">
+            <a:schemeClr val="accent1"/>
+          </a:fillRef>
+          <a:effectRef idx="0">
+            <a:schemeClr val="accent1"/>
+          </a:effectRef>
+          <a:fontRef idx="minor">
+            <a:schemeClr val="lt1"/>
+          </a:fontRef>
+        </p:style>
+        <p:txBody>
+          <a:bodyPr rtlCol="0" anchor="ctr"/>
+          <a:lstStyle/>
+          <a:p>
+            <a:pPr algn="ctr"/>
+            <a:r>
+              <a:rPr lang="en-US" altLang="zh-TW" sz="2800" dirty="0" smtClean="0"/>
+              <a:t>C</a:t>
+            </a:r>
+            <a:endParaRPr lang="zh-TW" altLang="en-US" sz="2800" dirty="0"/>
+          </a:p>
+        </p:txBody>
+      </p:sp>
+      <p:cxnSp>
+        <p:nvCxnSpPr>
+          <p:cNvPr id="57" name="直線單箭頭接點 56"/>
+          <p:cNvCxnSpPr/>
+          <p:nvPr/>
+        </p:nvCxnSpPr>
+        <p:spPr>
+          <a:xfrm>
+            <a:off x="8298534" y="2178754"/>
+            <a:ext cx="510039" cy="865136"/>
+          </a:xfrm>
+          <a:prstGeom prst="straightConnector1">
+            <a:avLst/>
+          </a:prstGeom>
+          <a:ln>
+            <a:tailEnd type="triangle"/>
+          </a:ln>
+        </p:spPr>
+        <p:style>
+          <a:lnRef idx="1">
+            <a:schemeClr val="dk1"/>
+          </a:lnRef>
+          <a:fillRef idx="0">
+            <a:schemeClr val="dk1"/>
+          </a:fillRef>
+          <a:effectRef idx="0">
+            <a:schemeClr val="dk1"/>
+          </a:effectRef>
+          <a:fontRef idx="minor">
+            <a:schemeClr val="tx1"/>
+          </a:fontRef>
+        </p:style>
+      </p:cxnSp>
+      <p:cxnSp>
+        <p:nvCxnSpPr>
+          <p:cNvPr id="58" name="直線單箭頭接點 57"/>
+          <p:cNvCxnSpPr/>
+          <p:nvPr/>
+        </p:nvCxnSpPr>
+        <p:spPr>
+          <a:xfrm>
+            <a:off x="9156434" y="4169702"/>
+            <a:ext cx="710667" cy="799863"/>
+          </a:xfrm>
+          <a:prstGeom prst="straightConnector1">
+            <a:avLst/>
+          </a:prstGeom>
+          <a:ln>
+            <a:tailEnd type="triangle"/>
+          </a:ln>
+        </p:spPr>
+        <p:style>
+          <a:lnRef idx="1">
+            <a:schemeClr val="dk1"/>
+          </a:lnRef>
+          <a:fillRef idx="0">
+            <a:schemeClr val="dk1"/>
+          </a:fillRef>
+          <a:effectRef idx="0">
+            <a:schemeClr val="dk1"/>
+          </a:effectRef>
+          <a:fontRef idx="minor">
+            <a:schemeClr val="tx1"/>
+          </a:fontRef>
+        </p:style>
+      </p:cxnSp>
+      <p:sp>
+        <p:nvSpPr>
+          <p:cNvPr id="59" name="橢圓 58"/>
+          <p:cNvSpPr/>
+          <p:nvPr/>
+        </p:nvSpPr>
+        <p:spPr>
+          <a:xfrm>
+            <a:off x="9631688" y="5086161"/>
+            <a:ext cx="1146629" cy="1088571"/>
+          </a:xfrm>
+          <a:prstGeom prst="ellipse">
+            <a:avLst/>
+          </a:prstGeom>
+        </p:spPr>
+        <p:style>
+          <a:lnRef idx="2">
+            <a:schemeClr val="accent1">
+              <a:shade val="50000"/>
+            </a:schemeClr>
+          </a:lnRef>
+          <a:fillRef idx="1">
+            <a:schemeClr val="accent1"/>
+          </a:fillRef>
+          <a:effectRef idx="0">
+            <a:schemeClr val="accent1"/>
+          </a:effectRef>
+          <a:fontRef idx="minor">
+            <a:schemeClr val="lt1"/>
+          </a:fontRef>
+        </p:style>
+        <p:txBody>
+          <a:bodyPr rtlCol="0" anchor="ctr"/>
+          <a:lstStyle/>
+          <a:p>
+            <a:pPr algn="ctr"/>
+            <a:r>
+              <a:rPr lang="en-US" altLang="zh-TW" sz="2800" dirty="0"/>
+              <a:t>F</a:t>
+            </a:r>
+            <a:endParaRPr lang="zh-TW" altLang="en-US" sz="2800" dirty="0"/>
+          </a:p>
+        </p:txBody>
+      </p:sp>
+      <p:sp>
+        <p:nvSpPr>
+          <p:cNvPr id="60" name="文字方塊 59"/>
+          <p:cNvSpPr txBox="1"/>
+          <p:nvPr/>
+        </p:nvSpPr>
+        <p:spPr>
+          <a:xfrm>
+            <a:off x="6885955" y="6205783"/>
+            <a:ext cx="1858201" cy="369332"/>
+          </a:xfrm>
+          <a:prstGeom prst="rect">
+            <a:avLst/>
+          </a:prstGeom>
+          <a:noFill/>
+        </p:spPr>
+        <p:txBody>
+          <a:bodyPr wrap="none" rtlCol="0">
+            <a:spAutoFit/>
+          </a:bodyPr>
+          <a:lstStyle/>
+          <a:p>
+            <a:r>
+              <a:rPr lang="zh-TW" altLang="en-US" b="1" dirty="0" smtClean="0">
+                <a:latin typeface="微軟正黑體" panose="020B0604030504040204" pitchFamily="34" charset="-120"/>
+                <a:ea typeface="微軟正黑體" panose="020B0604030504040204" pitchFamily="34" charset="-120"/>
+              </a:rPr>
+              <a:t>不為</a:t>
+            </a:r>
+            <a:r>
+              <a:rPr lang="zh-TW" altLang="en-US" b="1" dirty="0" smtClean="0">
+                <a:latin typeface="微軟正黑體" panose="020B0604030504040204" pitchFamily="34" charset="-120"/>
+                <a:ea typeface="微軟正黑體" panose="020B0604030504040204" pitchFamily="34" charset="-120"/>
+              </a:rPr>
+              <a:t>完整二元樹 </a:t>
+            </a:r>
+            <a:endParaRPr lang="zh-TW" altLang="en-US" b="1" dirty="0">
+              <a:latin typeface="微軟正黑體" panose="020B0604030504040204" pitchFamily="34" charset="-120"/>
+              <a:ea typeface="微軟正黑體" panose="020B0604030504040204" pitchFamily="34" charset="-120"/>
+            </a:endParaRPr>
+          </a:p>
+        </p:txBody>
+      </p:sp>
+      <p:cxnSp>
+        <p:nvCxnSpPr>
+          <p:cNvPr id="61" name="直線接點 60"/>
+          <p:cNvCxnSpPr/>
+          <p:nvPr/>
+        </p:nvCxnSpPr>
+        <p:spPr>
+          <a:xfrm flipV="1">
+            <a:off x="5220393" y="673331"/>
+            <a:ext cx="0" cy="5790869"/>
+          </a:xfrm>
+          <a:prstGeom prst="line">
+            <a:avLst/>
+          </a:prstGeom>
+          <a:ln w="28575">
+            <a:prstDash val="lgDashDotDot"/>
+          </a:ln>
+        </p:spPr>
+        <p:style>
+          <a:lnRef idx="1">
+            <a:schemeClr val="accent4"/>
+          </a:lnRef>
+          <a:fillRef idx="0">
+            <a:schemeClr val="accent4"/>
+          </a:fillRef>
+          <a:effectRef idx="0">
+            <a:schemeClr val="accent4"/>
+          </a:effectRef>
+          <a:fontRef idx="minor">
+            <a:schemeClr val="tx1"/>
+          </a:fontRef>
+        </p:style>
+      </p:cxnSp>
+    </p:spTree>
+    <p:extLst>
+      <p:ext uri="{BB962C8B-B14F-4D97-AF65-F5344CB8AC3E}">
+        <p14:creationId xmlns:p14="http://schemas.microsoft.com/office/powerpoint/2010/main" val="2770873132"/>
+      </p:ext>
+    </p:extLst>
+  </p:cSld>
+  <p:clrMapOvr>
+    <a:masterClrMapping/>
+  </p:clrMapOvr>
+</p:sld>
+</file>
+
+<file path=ppt/slides/slide5.xml><?xml version="1.0" encoding="utf-8"?>
+<p:sld xmlns:a="http://schemas.openxmlformats.org/drawingml/2006/main" xmlns:r="http://schemas.openxmlformats.org/officeDocument/2006/relationships" xmlns:p="http://schemas.openxmlformats.org/presentationml/2006/main">
+  <p:cSld>
+    <p:spTree>
+      <p:nvGrpSpPr>
+        <p:cNvPr id="1" name=""/>
+        <p:cNvGrpSpPr/>
+        <p:nvPr/>
+      </p:nvGrpSpPr>
+      <p:grpSpPr>
+        <a:xfrm>
+          <a:off x="0" y="0"/>
+          <a:ext cx="0" cy="0"/>
+          <a:chOff x="0" y="0"/>
+          <a:chExt cx="0" cy="0"/>
+        </a:xfrm>
+      </p:grpSpPr>
+      <p:sp>
+        <p:nvSpPr>
+          <p:cNvPr id="4" name="文字方塊 3"/>
+          <p:cNvSpPr txBox="1"/>
+          <p:nvPr/>
+        </p:nvSpPr>
+        <p:spPr>
+          <a:xfrm>
+            <a:off x="443947" y="266772"/>
+            <a:ext cx="3085845" cy="369332"/>
+          </a:xfrm>
+          <a:prstGeom prst="rect">
+            <a:avLst/>
+          </a:prstGeom>
+          <a:noFill/>
+        </p:spPr>
+        <p:txBody>
+          <a:bodyPr wrap="none" rtlCol="0">
+            <a:spAutoFit/>
+          </a:bodyPr>
+          <a:lstStyle/>
+          <a:p>
+            <a:r>
+              <a:rPr lang="zh-TW" altLang="en-US" b="1" dirty="0">
+                <a:latin typeface="微軟正黑體" panose="020B0604030504040204" pitchFamily="34" charset="-120"/>
+                <a:ea typeface="微軟正黑體" panose="020B0604030504040204" pitchFamily="34" charset="-120"/>
+              </a:rPr>
+              <a:t>歪斜</a:t>
+            </a:r>
+            <a:r>
+              <a:rPr lang="zh-TW" altLang="en-US" b="1" dirty="0" smtClean="0">
+                <a:latin typeface="微軟正黑體" panose="020B0604030504040204" pitchFamily="34" charset="-120"/>
+                <a:ea typeface="微軟正黑體" panose="020B0604030504040204" pitchFamily="34" charset="-120"/>
+              </a:rPr>
+              <a:t>樹 </a:t>
+            </a:r>
+            <a:r>
+              <a:rPr lang="en-US" altLang="zh-TW" b="1" dirty="0" smtClean="0">
+                <a:latin typeface="微軟正黑體" panose="020B0604030504040204" pitchFamily="34" charset="-120"/>
+                <a:ea typeface="微軟正黑體" panose="020B0604030504040204" pitchFamily="34" charset="-120"/>
+              </a:rPr>
+              <a:t>Skewed Binary Tree</a:t>
+            </a:r>
+            <a:endParaRPr lang="zh-TW" altLang="en-US" b="1" dirty="0">
+              <a:latin typeface="微軟正黑體" panose="020B0604030504040204" pitchFamily="34" charset="-120"/>
+              <a:ea typeface="微軟正黑體" panose="020B0604030504040204" pitchFamily="34" charset="-120"/>
+            </a:endParaRPr>
+          </a:p>
+        </p:txBody>
+      </p:sp>
+      <p:sp>
+        <p:nvSpPr>
+          <p:cNvPr id="5" name="橢圓 4"/>
+          <p:cNvSpPr/>
+          <p:nvPr/>
+        </p:nvSpPr>
+        <p:spPr>
+          <a:xfrm>
+            <a:off x="2236445" y="1314735"/>
+            <a:ext cx="1146629" cy="1088571"/>
+          </a:xfrm>
+          <a:prstGeom prst="ellipse">
+            <a:avLst/>
+          </a:prstGeom>
+        </p:spPr>
+        <p:style>
+          <a:lnRef idx="2">
+            <a:schemeClr val="accent1">
+              <a:shade val="50000"/>
+            </a:schemeClr>
+          </a:lnRef>
+          <a:fillRef idx="1">
+            <a:schemeClr val="accent1"/>
+          </a:fillRef>
+          <a:effectRef idx="0">
+            <a:schemeClr val="accent1"/>
+          </a:effectRef>
+          <a:fontRef idx="minor">
+            <a:schemeClr val="lt1"/>
+          </a:fontRef>
+        </p:style>
+        <p:txBody>
+          <a:bodyPr rtlCol="0" anchor="ctr"/>
+          <a:lstStyle/>
+          <a:p>
+            <a:pPr algn="ctr"/>
+            <a:r>
+              <a:rPr lang="en-US" altLang="zh-TW" sz="2800" dirty="0"/>
+              <a:t>A</a:t>
+            </a:r>
+            <a:endParaRPr lang="zh-TW" altLang="en-US" sz="2800" dirty="0"/>
+          </a:p>
+        </p:txBody>
+      </p:sp>
+      <p:cxnSp>
+        <p:nvCxnSpPr>
+          <p:cNvPr id="6" name="直線單箭頭接點 5"/>
+          <p:cNvCxnSpPr/>
+          <p:nvPr/>
+        </p:nvCxnSpPr>
+        <p:spPr>
+          <a:xfrm flipH="1">
+            <a:off x="2236445" y="2440546"/>
+            <a:ext cx="573314" cy="861761"/>
+          </a:xfrm>
+          <a:prstGeom prst="straightConnector1">
+            <a:avLst/>
+          </a:prstGeom>
+          <a:ln>
+            <a:tailEnd type="triangle"/>
+          </a:ln>
+        </p:spPr>
+        <p:style>
+          <a:lnRef idx="1">
+            <a:schemeClr val="dk1"/>
+          </a:lnRef>
+          <a:fillRef idx="0">
+            <a:schemeClr val="dk1"/>
+          </a:fillRef>
+          <a:effectRef idx="0">
+            <a:schemeClr val="dk1"/>
+          </a:effectRef>
+          <a:fontRef idx="minor">
+            <a:schemeClr val="tx1"/>
+          </a:fontRef>
+        </p:style>
+      </p:cxnSp>
+      <p:sp>
+        <p:nvSpPr>
+          <p:cNvPr id="8" name="橢圓 7"/>
+          <p:cNvSpPr/>
+          <p:nvPr/>
+        </p:nvSpPr>
+        <p:spPr>
+          <a:xfrm>
+            <a:off x="1413554" y="3339548"/>
+            <a:ext cx="1146629" cy="1088571"/>
+          </a:xfrm>
+          <a:prstGeom prst="ellipse">
+            <a:avLst/>
+          </a:prstGeom>
+        </p:spPr>
+        <p:style>
+          <a:lnRef idx="2">
+            <a:schemeClr val="accent1">
+              <a:shade val="50000"/>
+            </a:schemeClr>
+          </a:lnRef>
+          <a:fillRef idx="1">
+            <a:schemeClr val="accent1"/>
+          </a:fillRef>
+          <a:effectRef idx="0">
+            <a:schemeClr val="accent1"/>
+          </a:effectRef>
+          <a:fontRef idx="minor">
+            <a:schemeClr val="lt1"/>
+          </a:fontRef>
+        </p:style>
+        <p:txBody>
+          <a:bodyPr rtlCol="0" anchor="ctr"/>
+          <a:lstStyle/>
+          <a:p>
+            <a:pPr algn="ctr"/>
+            <a:r>
+              <a:rPr lang="en-US" altLang="zh-TW" sz="2800" dirty="0" smtClean="0"/>
+              <a:t>B</a:t>
+            </a:r>
+            <a:endParaRPr lang="zh-TW" altLang="en-US" sz="2800" dirty="0"/>
+          </a:p>
+        </p:txBody>
+      </p:sp>
+      <p:sp>
+        <p:nvSpPr>
+          <p:cNvPr id="10" name="橢圓 9"/>
+          <p:cNvSpPr/>
+          <p:nvPr/>
+        </p:nvSpPr>
+        <p:spPr>
+          <a:xfrm>
+            <a:off x="583079" y="5432093"/>
+            <a:ext cx="1146629" cy="1088571"/>
+          </a:xfrm>
+          <a:prstGeom prst="ellipse">
+            <a:avLst/>
+          </a:prstGeom>
+        </p:spPr>
+        <p:style>
+          <a:lnRef idx="2">
+            <a:schemeClr val="accent1">
+              <a:shade val="50000"/>
+            </a:schemeClr>
+          </a:lnRef>
+          <a:fillRef idx="1">
+            <a:schemeClr val="accent1"/>
+          </a:fillRef>
+          <a:effectRef idx="0">
+            <a:schemeClr val="accent1"/>
+          </a:effectRef>
+          <a:fontRef idx="minor">
+            <a:schemeClr val="lt1"/>
+          </a:fontRef>
+        </p:style>
+        <p:txBody>
+          <a:bodyPr rtlCol="0" anchor="ctr"/>
+          <a:lstStyle/>
+          <a:p>
+            <a:pPr algn="ctr"/>
+            <a:r>
+              <a:rPr lang="en-US" altLang="zh-TW" sz="2800" dirty="0" smtClean="0"/>
+              <a:t>C</a:t>
+            </a:r>
+            <a:endParaRPr lang="zh-TW" altLang="en-US" sz="2800" dirty="0"/>
+          </a:p>
+        </p:txBody>
+      </p:sp>
+      <p:cxnSp>
+        <p:nvCxnSpPr>
+          <p:cNvPr id="12" name="直線單箭頭接點 11"/>
+          <p:cNvCxnSpPr/>
+          <p:nvPr/>
+        </p:nvCxnSpPr>
+        <p:spPr>
+          <a:xfrm flipH="1">
+            <a:off x="1156394" y="4502600"/>
+            <a:ext cx="573314" cy="861761"/>
+          </a:xfrm>
+          <a:prstGeom prst="straightConnector1">
+            <a:avLst/>
+          </a:prstGeom>
+          <a:ln>
+            <a:tailEnd type="triangle"/>
+          </a:ln>
+        </p:spPr>
+        <p:style>
+          <a:lnRef idx="1">
+            <a:schemeClr val="dk1"/>
+          </a:lnRef>
+          <a:fillRef idx="0">
+            <a:schemeClr val="dk1"/>
+          </a:fillRef>
+          <a:effectRef idx="0">
+            <a:schemeClr val="dk1"/>
+          </a:effectRef>
+          <a:fontRef idx="minor">
+            <a:schemeClr val="tx1"/>
+          </a:fontRef>
+        </p:style>
+      </p:cxnSp>
+      <p:sp>
+        <p:nvSpPr>
+          <p:cNvPr id="13" name="文字方塊 12"/>
+          <p:cNvSpPr txBox="1"/>
+          <p:nvPr/>
+        </p:nvSpPr>
+        <p:spPr>
+          <a:xfrm>
+            <a:off x="1536131" y="6269802"/>
+            <a:ext cx="1107996" cy="369332"/>
+          </a:xfrm>
+          <a:prstGeom prst="rect">
+            <a:avLst/>
+          </a:prstGeom>
+          <a:noFill/>
+        </p:spPr>
+        <p:txBody>
+          <a:bodyPr wrap="none" rtlCol="0">
+            <a:spAutoFit/>
+          </a:bodyPr>
+          <a:lstStyle/>
+          <a:p>
+            <a:r>
+              <a:rPr lang="zh-TW" altLang="en-US" b="1" dirty="0">
+                <a:latin typeface="微軟正黑體" panose="020B0604030504040204" pitchFamily="34" charset="-120"/>
+                <a:ea typeface="微軟正黑體" panose="020B0604030504040204" pitchFamily="34" charset="-120"/>
+              </a:rPr>
+              <a:t>左</a:t>
+            </a:r>
+            <a:r>
+              <a:rPr lang="zh-TW" altLang="en-US" b="1" dirty="0" smtClean="0">
+                <a:latin typeface="微軟正黑體" panose="020B0604030504040204" pitchFamily="34" charset="-120"/>
+                <a:ea typeface="微軟正黑體" panose="020B0604030504040204" pitchFamily="34" charset="-120"/>
+              </a:rPr>
+              <a:t>歪斜樹</a:t>
+            </a:r>
+            <a:endParaRPr lang="zh-TW" altLang="en-US" b="1" dirty="0">
+              <a:latin typeface="微軟正黑體" panose="020B0604030504040204" pitchFamily="34" charset="-120"/>
+              <a:ea typeface="微軟正黑體" panose="020B0604030504040204" pitchFamily="34" charset="-120"/>
+            </a:endParaRPr>
+          </a:p>
+        </p:txBody>
+      </p:sp>
+      <p:sp>
+        <p:nvSpPr>
+          <p:cNvPr id="14" name="橢圓 13"/>
+          <p:cNvSpPr/>
+          <p:nvPr/>
+        </p:nvSpPr>
+        <p:spPr>
+          <a:xfrm>
+            <a:off x="5843245" y="1247002"/>
+            <a:ext cx="1146629" cy="1088571"/>
+          </a:xfrm>
+          <a:prstGeom prst="ellipse">
+            <a:avLst/>
+          </a:prstGeom>
+        </p:spPr>
+        <p:style>
+          <a:lnRef idx="2">
+            <a:schemeClr val="accent1">
+              <a:shade val="50000"/>
+            </a:schemeClr>
+          </a:lnRef>
+          <a:fillRef idx="1">
+            <a:schemeClr val="accent1"/>
+          </a:fillRef>
+          <a:effectRef idx="0">
+            <a:schemeClr val="accent1"/>
+          </a:effectRef>
+          <a:fontRef idx="minor">
+            <a:schemeClr val="lt1"/>
+          </a:fontRef>
+        </p:style>
+        <p:txBody>
+          <a:bodyPr rtlCol="0" anchor="ctr"/>
+          <a:lstStyle/>
+          <a:p>
+            <a:pPr algn="ctr"/>
+            <a:r>
+              <a:rPr lang="en-US" altLang="zh-TW" sz="2800" dirty="0"/>
+              <a:t>A</a:t>
+            </a:r>
+            <a:endParaRPr lang="zh-TW" altLang="en-US" sz="2800" dirty="0"/>
+          </a:p>
+        </p:txBody>
+      </p:sp>
+      <p:cxnSp>
+        <p:nvCxnSpPr>
+          <p:cNvPr id="15" name="直線單箭頭接點 14"/>
+          <p:cNvCxnSpPr/>
+          <p:nvPr/>
+        </p:nvCxnSpPr>
+        <p:spPr>
+          <a:xfrm>
+            <a:off x="6492759" y="2450239"/>
+            <a:ext cx="497115" cy="852068"/>
+          </a:xfrm>
+          <a:prstGeom prst="straightConnector1">
+            <a:avLst/>
+          </a:prstGeom>
+          <a:ln>
+            <a:tailEnd type="triangle"/>
+          </a:ln>
+        </p:spPr>
+        <p:style>
+          <a:lnRef idx="1">
+            <a:schemeClr val="dk1"/>
+          </a:lnRef>
+          <a:fillRef idx="0">
+            <a:schemeClr val="dk1"/>
+          </a:fillRef>
+          <a:effectRef idx="0">
+            <a:schemeClr val="dk1"/>
+          </a:effectRef>
+          <a:fontRef idx="minor">
+            <a:schemeClr val="tx1"/>
+          </a:fontRef>
+        </p:style>
+      </p:cxnSp>
+      <p:sp>
+        <p:nvSpPr>
+          <p:cNvPr id="17" name="橢圓 16"/>
+          <p:cNvSpPr/>
+          <p:nvPr/>
+        </p:nvSpPr>
+        <p:spPr>
+          <a:xfrm>
+            <a:off x="6710699" y="3339548"/>
+            <a:ext cx="1146629" cy="1088571"/>
+          </a:xfrm>
+          <a:prstGeom prst="ellipse">
+            <a:avLst/>
+          </a:prstGeom>
+        </p:spPr>
+        <p:style>
+          <a:lnRef idx="2">
+            <a:schemeClr val="accent1">
+              <a:shade val="50000"/>
+            </a:schemeClr>
+          </a:lnRef>
+          <a:fillRef idx="1">
+            <a:schemeClr val="accent1"/>
+          </a:fillRef>
+          <a:effectRef idx="0">
+            <a:schemeClr val="accent1"/>
+          </a:effectRef>
+          <a:fontRef idx="minor">
+            <a:schemeClr val="lt1"/>
+          </a:fontRef>
+        </p:style>
+        <p:txBody>
+          <a:bodyPr rtlCol="0" anchor="ctr"/>
+          <a:lstStyle/>
+          <a:p>
+            <a:pPr algn="ctr"/>
+            <a:r>
+              <a:rPr lang="en-US" altLang="zh-TW" sz="2800" dirty="0" smtClean="0"/>
+              <a:t>B</a:t>
+            </a:r>
+            <a:endParaRPr lang="zh-TW" altLang="en-US" sz="2800" dirty="0"/>
+          </a:p>
+        </p:txBody>
+      </p:sp>
+      <p:cxnSp>
+        <p:nvCxnSpPr>
+          <p:cNvPr id="18" name="直線單箭頭接點 17"/>
+          <p:cNvCxnSpPr/>
+          <p:nvPr/>
+        </p:nvCxnSpPr>
+        <p:spPr>
+          <a:xfrm>
+            <a:off x="7483359" y="4507446"/>
+            <a:ext cx="497115" cy="852068"/>
+          </a:xfrm>
+          <a:prstGeom prst="straightConnector1">
+            <a:avLst/>
+          </a:prstGeom>
+          <a:ln>
+            <a:tailEnd type="triangle"/>
+          </a:ln>
+        </p:spPr>
+        <p:style>
+          <a:lnRef idx="1">
+            <a:schemeClr val="dk1"/>
+          </a:lnRef>
+          <a:fillRef idx="0">
+            <a:schemeClr val="dk1"/>
+          </a:fillRef>
+          <a:effectRef idx="0">
+            <a:schemeClr val="dk1"/>
+          </a:effectRef>
+          <a:fontRef idx="minor">
+            <a:schemeClr val="tx1"/>
+          </a:fontRef>
+        </p:style>
+      </p:cxnSp>
+      <p:sp>
+        <p:nvSpPr>
+          <p:cNvPr id="19" name="橢圓 18"/>
+          <p:cNvSpPr/>
+          <p:nvPr/>
+        </p:nvSpPr>
+        <p:spPr>
+          <a:xfrm>
+            <a:off x="7586169" y="5432094"/>
+            <a:ext cx="1146629" cy="1088571"/>
+          </a:xfrm>
+          <a:prstGeom prst="ellipse">
+            <a:avLst/>
+          </a:prstGeom>
+        </p:spPr>
+        <p:style>
+          <a:lnRef idx="2">
+            <a:schemeClr val="accent1">
+              <a:shade val="50000"/>
+            </a:schemeClr>
+          </a:lnRef>
+          <a:fillRef idx="1">
+            <a:schemeClr val="accent1"/>
+          </a:fillRef>
+          <a:effectRef idx="0">
+            <a:schemeClr val="accent1"/>
+          </a:effectRef>
+          <a:fontRef idx="minor">
+            <a:schemeClr val="lt1"/>
+          </a:fontRef>
+        </p:style>
+        <p:txBody>
+          <a:bodyPr rtlCol="0" anchor="ctr"/>
+          <a:lstStyle/>
+          <a:p>
+            <a:pPr algn="ctr"/>
+            <a:r>
+              <a:rPr lang="en-US" altLang="zh-TW" sz="2800" dirty="0" smtClean="0"/>
+              <a:t>C</a:t>
+            </a:r>
+            <a:endParaRPr lang="zh-TW" altLang="en-US" sz="2800" dirty="0"/>
+          </a:p>
+        </p:txBody>
+      </p:sp>
+      <p:sp>
+        <p:nvSpPr>
+          <p:cNvPr id="20" name="文字方塊 19"/>
+          <p:cNvSpPr txBox="1"/>
+          <p:nvPr/>
+        </p:nvSpPr>
+        <p:spPr>
+          <a:xfrm>
+            <a:off x="8732798" y="6162698"/>
+            <a:ext cx="1107996" cy="369332"/>
+          </a:xfrm>
+          <a:prstGeom prst="rect">
+            <a:avLst/>
+          </a:prstGeom>
+          <a:noFill/>
+        </p:spPr>
+        <p:txBody>
+          <a:bodyPr wrap="none" rtlCol="0">
+            <a:spAutoFit/>
+          </a:bodyPr>
+          <a:lstStyle/>
+          <a:p>
+            <a:r>
+              <a:rPr lang="zh-TW" altLang="en-US" b="1" dirty="0" smtClean="0">
+                <a:latin typeface="微軟正黑體" panose="020B0604030504040204" pitchFamily="34" charset="-120"/>
+                <a:ea typeface="微軟正黑體" panose="020B0604030504040204" pitchFamily="34" charset="-120"/>
+              </a:rPr>
+              <a:t>右歪斜樹</a:t>
+            </a:r>
+            <a:endParaRPr lang="zh-TW" altLang="en-US" b="1" dirty="0">
+              <a:latin typeface="微軟正黑體" panose="020B0604030504040204" pitchFamily="34" charset="-120"/>
+              <a:ea typeface="微軟正黑體" panose="020B0604030504040204" pitchFamily="34" charset="-120"/>
+            </a:endParaRPr>
+          </a:p>
+        </p:txBody>
+      </p:sp>
+    </p:spTree>
+    <p:extLst>
+      <p:ext uri="{BB962C8B-B14F-4D97-AF65-F5344CB8AC3E}">
+        <p14:creationId xmlns:p14="http://schemas.microsoft.com/office/powerpoint/2010/main" val="3607160733"/>
       </p:ext>
     </p:extLst>
   </p:cSld>

</xml_diff>